<commit_message>
Cập nhật lại pptx
</commit_message>
<xml_diff>
--- a/final_project_proposal.pptx
+++ b/final_project_proposal.pptx
@@ -4,6 +4,9 @@
   <p:sldMasterIdLst>
     <p:sldMasterId id="2147483648" r:id="rId1"/>
   </p:sldMasterIdLst>
+  <p:notesMasterIdLst>
+    <p:notesMasterId r:id="rId14"/>
+  </p:notesMasterIdLst>
   <p:sldIdLst>
     <p:sldId id="256" r:id="rId2"/>
     <p:sldId id="257" r:id="rId3"/>
@@ -11,8 +14,12 @@
     <p:sldId id="259" r:id="rId5"/>
     <p:sldId id="260" r:id="rId6"/>
     <p:sldId id="261" r:id="rId7"/>
-    <p:sldId id="263" r:id="rId8"/>
-    <p:sldId id="262" r:id="rId9"/>
+    <p:sldId id="266" r:id="rId8"/>
+    <p:sldId id="268" r:id="rId9"/>
+    <p:sldId id="263" r:id="rId10"/>
+    <p:sldId id="264" r:id="rId11"/>
+    <p:sldId id="265" r:id="rId12"/>
+    <p:sldId id="262" r:id="rId13"/>
   </p:sldIdLst>
   <p:sldSz cx="12192000" cy="6858000"/>
   <p:notesSz cx="6858000" cy="9144000"/>
@@ -119,6 +126,523 @@
 </p:presentation>
 </file>
 
+<file path=ppt/notesMasters/notesMaster1.xml><?xml version="1.0" encoding="utf-8"?>
+<p:notesMaster xmlns:a="http://schemas.openxmlformats.org/drawingml/2006/main" xmlns:r="http://schemas.openxmlformats.org/officeDocument/2006/relationships" xmlns:p="http://schemas.openxmlformats.org/presentationml/2006/main">
+  <p:cSld>
+    <p:bg>
+      <p:bgRef idx="1001">
+        <a:schemeClr val="bg1"/>
+      </p:bgRef>
+    </p:bg>
+    <p:spTree>
+      <p:nvGrpSpPr>
+        <p:cNvPr id="1" name=""/>
+        <p:cNvGrpSpPr/>
+        <p:nvPr/>
+      </p:nvGrpSpPr>
+      <p:grpSpPr>
+        <a:xfrm>
+          <a:off x="0" y="0"/>
+          <a:ext cx="0" cy="0"/>
+          <a:chOff x="0" y="0"/>
+          <a:chExt cx="0" cy="0"/>
+        </a:xfrm>
+      </p:grpSpPr>
+      <p:sp>
+        <p:nvSpPr>
+          <p:cNvPr id="2" name="Header Placeholder 1"/>
+          <p:cNvSpPr>
+            <a:spLocks noGrp="1"/>
+          </p:cNvSpPr>
+          <p:nvPr>
+            <p:ph type="hdr" sz="quarter"/>
+          </p:nvPr>
+        </p:nvSpPr>
+        <p:spPr>
+          <a:xfrm>
+            <a:off x="0" y="0"/>
+            <a:ext cx="2971800" cy="458788"/>
+          </a:xfrm>
+          <a:prstGeom prst="rect">
+            <a:avLst/>
+          </a:prstGeom>
+        </p:spPr>
+        <p:txBody>
+          <a:bodyPr vert="horz" lIns="91440" tIns="45720" rIns="91440" bIns="45720" rtlCol="0"/>
+          <a:lstStyle>
+            <a:lvl1pPr algn="l">
+              <a:defRPr sz="1200"/>
+            </a:lvl1pPr>
+          </a:lstStyle>
+          <a:p>
+            <a:endParaRPr lang="en-US"/>
+          </a:p>
+        </p:txBody>
+      </p:sp>
+      <p:sp>
+        <p:nvSpPr>
+          <p:cNvPr id="3" name="Date Placeholder 2"/>
+          <p:cNvSpPr>
+            <a:spLocks noGrp="1"/>
+          </p:cNvSpPr>
+          <p:nvPr>
+            <p:ph type="dt" idx="1"/>
+          </p:nvPr>
+        </p:nvSpPr>
+        <p:spPr>
+          <a:xfrm>
+            <a:off x="3884613" y="0"/>
+            <a:ext cx="2971800" cy="458788"/>
+          </a:xfrm>
+          <a:prstGeom prst="rect">
+            <a:avLst/>
+          </a:prstGeom>
+        </p:spPr>
+        <p:txBody>
+          <a:bodyPr vert="horz" lIns="91440" tIns="45720" rIns="91440" bIns="45720" rtlCol="0"/>
+          <a:lstStyle>
+            <a:lvl1pPr algn="r">
+              <a:defRPr sz="1200"/>
+            </a:lvl1pPr>
+          </a:lstStyle>
+          <a:p>
+            <a:fld id="{596DE3F2-4EF7-4D38-9E4B-96618CF4DA3C}" type="datetimeFigureOut">
+              <a:rPr lang="en-US" smtClean="0"/>
+              <a:t>12/27/2023</a:t>
+            </a:fld>
+            <a:endParaRPr lang="en-US"/>
+          </a:p>
+        </p:txBody>
+      </p:sp>
+      <p:sp>
+        <p:nvSpPr>
+          <p:cNvPr id="4" name="Slide Image Placeholder 3"/>
+          <p:cNvSpPr>
+            <a:spLocks noGrp="1" noRot="1" noChangeAspect="1"/>
+          </p:cNvSpPr>
+          <p:nvPr>
+            <p:ph type="sldImg" idx="2"/>
+          </p:nvPr>
+        </p:nvSpPr>
+        <p:spPr>
+          <a:xfrm>
+            <a:off x="685800" y="1143000"/>
+            <a:ext cx="5486400" cy="3086100"/>
+          </a:xfrm>
+          <a:prstGeom prst="rect">
+            <a:avLst/>
+          </a:prstGeom>
+          <a:noFill/>
+          <a:ln w="12700">
+            <a:solidFill>
+              <a:prstClr val="black"/>
+            </a:solidFill>
+          </a:ln>
+        </p:spPr>
+        <p:txBody>
+          <a:bodyPr vert="horz" lIns="91440" tIns="45720" rIns="91440" bIns="45720" rtlCol="0" anchor="ctr"/>
+          <a:lstStyle/>
+          <a:p>
+            <a:endParaRPr lang="en-US"/>
+          </a:p>
+        </p:txBody>
+      </p:sp>
+      <p:sp>
+        <p:nvSpPr>
+          <p:cNvPr id="5" name="Notes Placeholder 4"/>
+          <p:cNvSpPr>
+            <a:spLocks noGrp="1"/>
+          </p:cNvSpPr>
+          <p:nvPr>
+            <p:ph type="body" sz="quarter" idx="3"/>
+          </p:nvPr>
+        </p:nvSpPr>
+        <p:spPr>
+          <a:xfrm>
+            <a:off x="685800" y="4400550"/>
+            <a:ext cx="5486400" cy="3600450"/>
+          </a:xfrm>
+          <a:prstGeom prst="rect">
+            <a:avLst/>
+          </a:prstGeom>
+        </p:spPr>
+        <p:txBody>
+          <a:bodyPr vert="horz" lIns="91440" tIns="45720" rIns="91440" bIns="45720" rtlCol="0"/>
+          <a:lstStyle/>
+          <a:p>
+            <a:pPr lvl="0"/>
+            <a:r>
+              <a:rPr lang="en-US"/>
+              <a:t>Click to edit Master text styles</a:t>
+            </a:r>
+          </a:p>
+          <a:p>
+            <a:pPr lvl="1"/>
+            <a:r>
+              <a:rPr lang="en-US"/>
+              <a:t>Second level</a:t>
+            </a:r>
+          </a:p>
+          <a:p>
+            <a:pPr lvl="2"/>
+            <a:r>
+              <a:rPr lang="en-US"/>
+              <a:t>Third level</a:t>
+            </a:r>
+          </a:p>
+          <a:p>
+            <a:pPr lvl="3"/>
+            <a:r>
+              <a:rPr lang="en-US"/>
+              <a:t>Fourth level</a:t>
+            </a:r>
+          </a:p>
+          <a:p>
+            <a:pPr lvl="4"/>
+            <a:r>
+              <a:rPr lang="en-US"/>
+              <a:t>Fifth level</a:t>
+            </a:r>
+          </a:p>
+        </p:txBody>
+      </p:sp>
+      <p:sp>
+        <p:nvSpPr>
+          <p:cNvPr id="6" name="Footer Placeholder 5"/>
+          <p:cNvSpPr>
+            <a:spLocks noGrp="1"/>
+          </p:cNvSpPr>
+          <p:nvPr>
+            <p:ph type="ftr" sz="quarter" idx="4"/>
+          </p:nvPr>
+        </p:nvSpPr>
+        <p:spPr>
+          <a:xfrm>
+            <a:off x="0" y="8685213"/>
+            <a:ext cx="2971800" cy="458787"/>
+          </a:xfrm>
+          <a:prstGeom prst="rect">
+            <a:avLst/>
+          </a:prstGeom>
+        </p:spPr>
+        <p:txBody>
+          <a:bodyPr vert="horz" lIns="91440" tIns="45720" rIns="91440" bIns="45720" rtlCol="0" anchor="b"/>
+          <a:lstStyle>
+            <a:lvl1pPr algn="l">
+              <a:defRPr sz="1200"/>
+            </a:lvl1pPr>
+          </a:lstStyle>
+          <a:p>
+            <a:endParaRPr lang="en-US"/>
+          </a:p>
+        </p:txBody>
+      </p:sp>
+      <p:sp>
+        <p:nvSpPr>
+          <p:cNvPr id="7" name="Slide Number Placeholder 6"/>
+          <p:cNvSpPr>
+            <a:spLocks noGrp="1"/>
+          </p:cNvSpPr>
+          <p:nvPr>
+            <p:ph type="sldNum" sz="quarter" idx="5"/>
+          </p:nvPr>
+        </p:nvSpPr>
+        <p:spPr>
+          <a:xfrm>
+            <a:off x="3884613" y="8685213"/>
+            <a:ext cx="2971800" cy="458787"/>
+          </a:xfrm>
+          <a:prstGeom prst="rect">
+            <a:avLst/>
+          </a:prstGeom>
+        </p:spPr>
+        <p:txBody>
+          <a:bodyPr vert="horz" lIns="91440" tIns="45720" rIns="91440" bIns="45720" rtlCol="0" anchor="b"/>
+          <a:lstStyle>
+            <a:lvl1pPr algn="r">
+              <a:defRPr sz="1200"/>
+            </a:lvl1pPr>
+          </a:lstStyle>
+          <a:p>
+            <a:fld id="{89552A2F-5829-4A3F-AE2D-0B8A2DB57911}" type="slidenum">
+              <a:rPr lang="en-US" smtClean="0"/>
+              <a:t>‹#›</a:t>
+            </a:fld>
+            <a:endParaRPr lang="en-US"/>
+          </a:p>
+        </p:txBody>
+      </p:sp>
+    </p:spTree>
+    <p:extLst>
+      <p:ext uri="{BB962C8B-B14F-4D97-AF65-F5344CB8AC3E}">
+        <p14:creationId xmlns:p14="http://schemas.microsoft.com/office/powerpoint/2010/main" val="3543443498"/>
+      </p:ext>
+    </p:extLst>
+  </p:cSld>
+  <p:clrMap bg1="lt1" tx1="dk1" bg2="lt2" tx2="dk2" accent1="accent1" accent2="accent2" accent3="accent3" accent4="accent4" accent5="accent5" accent6="accent6" hlink="hlink" folHlink="folHlink"/>
+  <p:notesStyle>
+    <a:lvl1pPr marL="0" algn="l" defTabSz="914400" rtl="0" eaLnBrk="1" latinLnBrk="0" hangingPunct="1">
+      <a:defRPr sz="1200" kern="1200">
+        <a:solidFill>
+          <a:schemeClr val="tx1"/>
+        </a:solidFill>
+        <a:latin typeface="+mn-lt"/>
+        <a:ea typeface="+mn-ea"/>
+        <a:cs typeface="+mn-cs"/>
+      </a:defRPr>
+    </a:lvl1pPr>
+    <a:lvl2pPr marL="457200" algn="l" defTabSz="914400" rtl="0" eaLnBrk="1" latinLnBrk="0" hangingPunct="1">
+      <a:defRPr sz="1200" kern="1200">
+        <a:solidFill>
+          <a:schemeClr val="tx1"/>
+        </a:solidFill>
+        <a:latin typeface="+mn-lt"/>
+        <a:ea typeface="+mn-ea"/>
+        <a:cs typeface="+mn-cs"/>
+      </a:defRPr>
+    </a:lvl2pPr>
+    <a:lvl3pPr marL="914400" algn="l" defTabSz="914400" rtl="0" eaLnBrk="1" latinLnBrk="0" hangingPunct="1">
+      <a:defRPr sz="1200" kern="1200">
+        <a:solidFill>
+          <a:schemeClr val="tx1"/>
+        </a:solidFill>
+        <a:latin typeface="+mn-lt"/>
+        <a:ea typeface="+mn-ea"/>
+        <a:cs typeface="+mn-cs"/>
+      </a:defRPr>
+    </a:lvl3pPr>
+    <a:lvl4pPr marL="1371600" algn="l" defTabSz="914400" rtl="0" eaLnBrk="1" latinLnBrk="0" hangingPunct="1">
+      <a:defRPr sz="1200" kern="1200">
+        <a:solidFill>
+          <a:schemeClr val="tx1"/>
+        </a:solidFill>
+        <a:latin typeface="+mn-lt"/>
+        <a:ea typeface="+mn-ea"/>
+        <a:cs typeface="+mn-cs"/>
+      </a:defRPr>
+    </a:lvl4pPr>
+    <a:lvl5pPr marL="1828800" algn="l" defTabSz="914400" rtl="0" eaLnBrk="1" latinLnBrk="0" hangingPunct="1">
+      <a:defRPr sz="1200" kern="1200">
+        <a:solidFill>
+          <a:schemeClr val="tx1"/>
+        </a:solidFill>
+        <a:latin typeface="+mn-lt"/>
+        <a:ea typeface="+mn-ea"/>
+        <a:cs typeface="+mn-cs"/>
+      </a:defRPr>
+    </a:lvl5pPr>
+    <a:lvl6pPr marL="2286000" algn="l" defTabSz="914400" rtl="0" eaLnBrk="1" latinLnBrk="0" hangingPunct="1">
+      <a:defRPr sz="1200" kern="1200">
+        <a:solidFill>
+          <a:schemeClr val="tx1"/>
+        </a:solidFill>
+        <a:latin typeface="+mn-lt"/>
+        <a:ea typeface="+mn-ea"/>
+        <a:cs typeface="+mn-cs"/>
+      </a:defRPr>
+    </a:lvl6pPr>
+    <a:lvl7pPr marL="2743200" algn="l" defTabSz="914400" rtl="0" eaLnBrk="1" latinLnBrk="0" hangingPunct="1">
+      <a:defRPr sz="1200" kern="1200">
+        <a:solidFill>
+          <a:schemeClr val="tx1"/>
+        </a:solidFill>
+        <a:latin typeface="+mn-lt"/>
+        <a:ea typeface="+mn-ea"/>
+        <a:cs typeface="+mn-cs"/>
+      </a:defRPr>
+    </a:lvl7pPr>
+    <a:lvl8pPr marL="3200400" algn="l" defTabSz="914400" rtl="0" eaLnBrk="1" latinLnBrk="0" hangingPunct="1">
+      <a:defRPr sz="1200" kern="1200">
+        <a:solidFill>
+          <a:schemeClr val="tx1"/>
+        </a:solidFill>
+        <a:latin typeface="+mn-lt"/>
+        <a:ea typeface="+mn-ea"/>
+        <a:cs typeface="+mn-cs"/>
+      </a:defRPr>
+    </a:lvl8pPr>
+    <a:lvl9pPr marL="3657600" algn="l" defTabSz="914400" rtl="0" eaLnBrk="1" latinLnBrk="0" hangingPunct="1">
+      <a:defRPr sz="1200" kern="1200">
+        <a:solidFill>
+          <a:schemeClr val="tx1"/>
+        </a:solidFill>
+        <a:latin typeface="+mn-lt"/>
+        <a:ea typeface="+mn-ea"/>
+        <a:cs typeface="+mn-cs"/>
+      </a:defRPr>
+    </a:lvl9pPr>
+  </p:notesStyle>
+</p:notesMaster>
+</file>
+
+<file path=ppt/notesSlides/notesSlide1.xml><?xml version="1.0" encoding="utf-8"?>
+<p:notes xmlns:a="http://schemas.openxmlformats.org/drawingml/2006/main" xmlns:r="http://schemas.openxmlformats.org/officeDocument/2006/relationships" xmlns:p="http://schemas.openxmlformats.org/presentationml/2006/main">
+  <p:cSld>
+    <p:spTree>
+      <p:nvGrpSpPr>
+        <p:cNvPr id="1" name=""/>
+        <p:cNvGrpSpPr/>
+        <p:nvPr/>
+      </p:nvGrpSpPr>
+      <p:grpSpPr>
+        <a:xfrm>
+          <a:off x="0" y="0"/>
+          <a:ext cx="0" cy="0"/>
+          <a:chOff x="0" y="0"/>
+          <a:chExt cx="0" cy="0"/>
+        </a:xfrm>
+      </p:grpSpPr>
+      <p:sp>
+        <p:nvSpPr>
+          <p:cNvPr id="2" name="Slide Image Placeholder 1"/>
+          <p:cNvSpPr>
+            <a:spLocks noGrp="1" noRot="1" noChangeAspect="1"/>
+          </p:cNvSpPr>
+          <p:nvPr>
+            <p:ph type="sldImg"/>
+          </p:nvPr>
+        </p:nvSpPr>
+        <p:spPr/>
+      </p:sp>
+      <p:sp>
+        <p:nvSpPr>
+          <p:cNvPr id="3" name="Notes Placeholder 2"/>
+          <p:cNvSpPr>
+            <a:spLocks noGrp="1"/>
+          </p:cNvSpPr>
+          <p:nvPr>
+            <p:ph type="body" idx="1"/>
+          </p:nvPr>
+        </p:nvSpPr>
+        <p:spPr/>
+        <p:txBody>
+          <a:bodyPr/>
+          <a:lstStyle/>
+          <a:p>
+            <a:endParaRPr lang="en-US"/>
+          </a:p>
+        </p:txBody>
+      </p:sp>
+      <p:sp>
+        <p:nvSpPr>
+          <p:cNvPr id="4" name="Slide Number Placeholder 3"/>
+          <p:cNvSpPr>
+            <a:spLocks noGrp="1"/>
+          </p:cNvSpPr>
+          <p:nvPr>
+            <p:ph type="sldNum" sz="quarter" idx="5"/>
+          </p:nvPr>
+        </p:nvSpPr>
+        <p:spPr/>
+        <p:txBody>
+          <a:bodyPr/>
+          <a:lstStyle/>
+          <a:p>
+            <a:fld id="{89552A2F-5829-4A3F-AE2D-0B8A2DB57911}" type="slidenum">
+              <a:rPr lang="en-US" smtClean="0"/>
+              <a:t>7</a:t>
+            </a:fld>
+            <a:endParaRPr lang="en-US"/>
+          </a:p>
+        </p:txBody>
+      </p:sp>
+    </p:spTree>
+    <p:extLst>
+      <p:ext uri="{BB962C8B-B14F-4D97-AF65-F5344CB8AC3E}">
+        <p14:creationId xmlns:p14="http://schemas.microsoft.com/office/powerpoint/2010/main" val="2851185121"/>
+      </p:ext>
+    </p:extLst>
+  </p:cSld>
+  <p:clrMapOvr>
+    <a:masterClrMapping/>
+  </p:clrMapOvr>
+</p:notes>
+</file>
+
+<file path=ppt/notesSlides/notesSlide2.xml><?xml version="1.0" encoding="utf-8"?>
+<p:notes xmlns:a="http://schemas.openxmlformats.org/drawingml/2006/main" xmlns:r="http://schemas.openxmlformats.org/officeDocument/2006/relationships" xmlns:p="http://schemas.openxmlformats.org/presentationml/2006/main">
+  <p:cSld>
+    <p:spTree>
+      <p:nvGrpSpPr>
+        <p:cNvPr id="1" name=""/>
+        <p:cNvGrpSpPr/>
+        <p:nvPr/>
+      </p:nvGrpSpPr>
+      <p:grpSpPr>
+        <a:xfrm>
+          <a:off x="0" y="0"/>
+          <a:ext cx="0" cy="0"/>
+          <a:chOff x="0" y="0"/>
+          <a:chExt cx="0" cy="0"/>
+        </a:xfrm>
+      </p:grpSpPr>
+      <p:sp>
+        <p:nvSpPr>
+          <p:cNvPr id="2" name="Slide Image Placeholder 1"/>
+          <p:cNvSpPr>
+            <a:spLocks noGrp="1" noRot="1" noChangeAspect="1"/>
+          </p:cNvSpPr>
+          <p:nvPr>
+            <p:ph type="sldImg"/>
+          </p:nvPr>
+        </p:nvSpPr>
+        <p:spPr/>
+      </p:sp>
+      <p:sp>
+        <p:nvSpPr>
+          <p:cNvPr id="3" name="Notes Placeholder 2"/>
+          <p:cNvSpPr>
+            <a:spLocks noGrp="1"/>
+          </p:cNvSpPr>
+          <p:nvPr>
+            <p:ph type="body" idx="1"/>
+          </p:nvPr>
+        </p:nvSpPr>
+        <p:spPr/>
+        <p:txBody>
+          <a:bodyPr/>
+          <a:lstStyle/>
+          <a:p>
+            <a:endParaRPr lang="en-US"/>
+          </a:p>
+        </p:txBody>
+      </p:sp>
+      <p:sp>
+        <p:nvSpPr>
+          <p:cNvPr id="4" name="Slide Number Placeholder 3"/>
+          <p:cNvSpPr>
+            <a:spLocks noGrp="1"/>
+          </p:cNvSpPr>
+          <p:nvPr>
+            <p:ph type="sldNum" sz="quarter" idx="5"/>
+          </p:nvPr>
+        </p:nvSpPr>
+        <p:spPr/>
+        <p:txBody>
+          <a:bodyPr/>
+          <a:lstStyle/>
+          <a:p>
+            <a:fld id="{89552A2F-5829-4A3F-AE2D-0B8A2DB57911}" type="slidenum">
+              <a:rPr lang="en-US" smtClean="0"/>
+              <a:t>8</a:t>
+            </a:fld>
+            <a:endParaRPr lang="en-US"/>
+          </a:p>
+        </p:txBody>
+      </p:sp>
+    </p:spTree>
+    <p:extLst>
+      <p:ext uri="{BB962C8B-B14F-4D97-AF65-F5344CB8AC3E}">
+        <p14:creationId xmlns:p14="http://schemas.microsoft.com/office/powerpoint/2010/main" val="131364761"/>
+      </p:ext>
+    </p:extLst>
+  </p:cSld>
+  <p:clrMapOvr>
+    <a:masterClrMapping/>
+  </p:clrMapOvr>
+</p:notes>
+</file>
+
 <file path=ppt/slideLayouts/slideLayout1.xml><?xml version="1.0" encoding="utf-8"?>
 <p:sldLayout xmlns:a="http://schemas.openxmlformats.org/drawingml/2006/main" xmlns:r="http://schemas.openxmlformats.org/officeDocument/2006/relationships" xmlns:p="http://schemas.openxmlformats.org/presentationml/2006/main" type="title" preserve="1">
   <p:cSld name="Title Slide">
@@ -266,7 +790,7 @@
           <a:p>
             <a:fld id="{EC6B8DFC-4419-4CB5-929E-D2864CDF9B10}" type="datetimeFigureOut">
               <a:rPr lang="en-US" smtClean="0"/>
-              <a:t>12/5/2023</a:t>
+              <a:t>12/27/2023</a:t>
             </a:fld>
             <a:endParaRPr lang="en-US" dirty="0"/>
           </a:p>
@@ -464,7 +988,7 @@
           <a:p>
             <a:fld id="{EC6B8DFC-4419-4CB5-929E-D2864CDF9B10}" type="datetimeFigureOut">
               <a:rPr lang="en-US" smtClean="0"/>
-              <a:t>12/5/2023</a:t>
+              <a:t>12/27/2023</a:t>
             </a:fld>
             <a:endParaRPr lang="en-US" dirty="0"/>
           </a:p>
@@ -672,7 +1196,7 @@
           <a:p>
             <a:fld id="{EC6B8DFC-4419-4CB5-929E-D2864CDF9B10}" type="datetimeFigureOut">
               <a:rPr lang="en-US" smtClean="0"/>
-              <a:t>12/5/2023</a:t>
+              <a:t>12/27/2023</a:t>
             </a:fld>
             <a:endParaRPr lang="en-US" dirty="0"/>
           </a:p>
@@ -870,7 +1394,7 @@
           <a:p>
             <a:fld id="{EC6B8DFC-4419-4CB5-929E-D2864CDF9B10}" type="datetimeFigureOut">
               <a:rPr lang="en-US" smtClean="0"/>
-              <a:t>12/5/2023</a:t>
+              <a:t>12/27/2023</a:t>
             </a:fld>
             <a:endParaRPr lang="en-US" dirty="0"/>
           </a:p>
@@ -1145,7 +1669,7 @@
           <a:p>
             <a:fld id="{EC6B8DFC-4419-4CB5-929E-D2864CDF9B10}" type="datetimeFigureOut">
               <a:rPr lang="en-US" smtClean="0"/>
-              <a:t>12/5/2023</a:t>
+              <a:t>12/27/2023</a:t>
             </a:fld>
             <a:endParaRPr lang="en-US" dirty="0"/>
           </a:p>
@@ -1410,7 +1934,7 @@
           <a:p>
             <a:fld id="{EC6B8DFC-4419-4CB5-929E-D2864CDF9B10}" type="datetimeFigureOut">
               <a:rPr lang="en-US" smtClean="0"/>
-              <a:t>12/5/2023</a:t>
+              <a:t>12/27/2023</a:t>
             </a:fld>
             <a:endParaRPr lang="en-US" dirty="0"/>
           </a:p>
@@ -1822,7 +2346,7 @@
           <a:p>
             <a:fld id="{EC6B8DFC-4419-4CB5-929E-D2864CDF9B10}" type="datetimeFigureOut">
               <a:rPr lang="en-US" smtClean="0"/>
-              <a:t>12/5/2023</a:t>
+              <a:t>12/27/2023</a:t>
             </a:fld>
             <a:endParaRPr lang="en-US" dirty="0"/>
           </a:p>
@@ -1963,7 +2487,7 @@
           <a:p>
             <a:fld id="{EC6B8DFC-4419-4CB5-929E-D2864CDF9B10}" type="datetimeFigureOut">
               <a:rPr lang="en-US" smtClean="0"/>
-              <a:t>12/5/2023</a:t>
+              <a:t>12/27/2023</a:t>
             </a:fld>
             <a:endParaRPr lang="en-US" dirty="0"/>
           </a:p>
@@ -2076,7 +2600,7 @@
           <a:p>
             <a:fld id="{EC6B8DFC-4419-4CB5-929E-D2864CDF9B10}" type="datetimeFigureOut">
               <a:rPr lang="en-US" smtClean="0"/>
-              <a:t>12/5/2023</a:t>
+              <a:t>12/27/2023</a:t>
             </a:fld>
             <a:endParaRPr lang="en-US" dirty="0"/>
           </a:p>
@@ -2387,7 +2911,7 @@
           <a:p>
             <a:fld id="{EC6B8DFC-4419-4CB5-929E-D2864CDF9B10}" type="datetimeFigureOut">
               <a:rPr lang="en-US" smtClean="0"/>
-              <a:t>12/5/2023</a:t>
+              <a:t>12/27/2023</a:t>
             </a:fld>
             <a:endParaRPr lang="en-US" dirty="0"/>
           </a:p>
@@ -2675,7 +3199,7 @@
           <a:p>
             <a:fld id="{EC6B8DFC-4419-4CB5-929E-D2864CDF9B10}" type="datetimeFigureOut">
               <a:rPr lang="en-US" smtClean="0"/>
-              <a:t>12/5/2023</a:t>
+              <a:t>12/27/2023</a:t>
             </a:fld>
             <a:endParaRPr lang="en-US" dirty="0"/>
           </a:p>
@@ -2916,7 +3440,7 @@
           <a:p>
             <a:fld id="{EC6B8DFC-4419-4CB5-929E-D2864CDF9B10}" type="datetimeFigureOut">
               <a:rPr lang="en-US" smtClean="0"/>
-              <a:t>12/5/2023</a:t>
+              <a:t>12/27/2023</a:t>
             </a:fld>
             <a:endParaRPr lang="en-US" dirty="0"/>
           </a:p>
@@ -3746,6 +4270,679 @@
 </p:sld>
 </file>
 
+<file path=ppt/slides/slide10.xml><?xml version="1.0" encoding="utf-8"?>
+<p:sld xmlns:a="http://schemas.openxmlformats.org/drawingml/2006/main" xmlns:r="http://schemas.openxmlformats.org/officeDocument/2006/relationships" xmlns:p="http://schemas.openxmlformats.org/presentationml/2006/main">
+  <p:cSld>
+    <p:spTree>
+      <p:nvGrpSpPr>
+        <p:cNvPr id="1" name=""/>
+        <p:cNvGrpSpPr/>
+        <p:nvPr/>
+      </p:nvGrpSpPr>
+      <p:grpSpPr>
+        <a:xfrm>
+          <a:off x="0" y="0"/>
+          <a:ext cx="0" cy="0"/>
+          <a:chOff x="0" y="0"/>
+          <a:chExt cx="0" cy="0"/>
+        </a:xfrm>
+      </p:grpSpPr>
+      <p:cxnSp>
+        <p:nvCxnSpPr>
+          <p:cNvPr id="4" name="Straight Connector 3">
+            <a:extLst>
+              <a:ext uri="{FF2B5EF4-FFF2-40B4-BE49-F238E27FC236}">
+                <a16:creationId xmlns:a16="http://schemas.microsoft.com/office/drawing/2014/main" id="{FD8945C5-D086-40AE-855A-DE1E0C847B8B}"/>
+              </a:ext>
+            </a:extLst>
+          </p:cNvPr>
+          <p:cNvCxnSpPr>
+            <a:cxnSpLocks/>
+          </p:cNvCxnSpPr>
+          <p:nvPr/>
+        </p:nvCxnSpPr>
+        <p:spPr>
+          <a:xfrm>
+            <a:off x="403635" y="736458"/>
+            <a:ext cx="1092200" cy="0"/>
+          </a:xfrm>
+          <a:prstGeom prst="line">
+            <a:avLst/>
+          </a:prstGeom>
+          <a:ln w="57150">
+            <a:solidFill>
+              <a:srgbClr val="C00000"/>
+            </a:solidFill>
+          </a:ln>
+        </p:spPr>
+        <p:style>
+          <a:lnRef idx="1">
+            <a:schemeClr val="accent1"/>
+          </a:lnRef>
+          <a:fillRef idx="0">
+            <a:schemeClr val="accent1"/>
+          </a:fillRef>
+          <a:effectRef idx="0">
+            <a:schemeClr val="accent1"/>
+          </a:effectRef>
+          <a:fontRef idx="minor">
+            <a:schemeClr val="tx1"/>
+          </a:fontRef>
+        </p:style>
+      </p:cxnSp>
+      <p:sp>
+        <p:nvSpPr>
+          <p:cNvPr id="5" name="TextBox 4">
+            <a:extLst>
+              <a:ext uri="{FF2B5EF4-FFF2-40B4-BE49-F238E27FC236}">
+                <a16:creationId xmlns:a16="http://schemas.microsoft.com/office/drawing/2014/main" id="{48F65BD5-DBA0-40D9-8CC7-2E2E5678ECE2}"/>
+              </a:ext>
+            </a:extLst>
+          </p:cNvPr>
+          <p:cNvSpPr txBox="1"/>
+          <p:nvPr/>
+        </p:nvSpPr>
+        <p:spPr>
+          <a:xfrm>
+            <a:off x="322612" y="244016"/>
+            <a:ext cx="8148320" cy="492443"/>
+          </a:xfrm>
+          <a:prstGeom prst="rect">
+            <a:avLst/>
+          </a:prstGeom>
+          <a:noFill/>
+        </p:spPr>
+        <p:txBody>
+          <a:bodyPr wrap="square" rtlCol="0">
+            <a:spAutoFit/>
+          </a:bodyPr>
+          <a:lstStyle/>
+          <a:p>
+            <a:r>
+              <a:rPr lang="en-US" sz="2600">
+                <a:latin typeface="Times New Roman" panose="02020603050405020304" pitchFamily="18" charset="0"/>
+                <a:cs typeface="Times New Roman" panose="02020603050405020304" pitchFamily="18" charset="0"/>
+              </a:rPr>
+              <a:t>Voting system and real ownership on your own property</a:t>
+            </a:r>
+            <a:endParaRPr lang="en-US" sz="2600" dirty="0">
+              <a:latin typeface="Times New Roman" panose="02020603050405020304" pitchFamily="18" charset="0"/>
+              <a:cs typeface="Times New Roman" panose="02020603050405020304" pitchFamily="18" charset="0"/>
+            </a:endParaRPr>
+          </a:p>
+        </p:txBody>
+      </p:sp>
+      <p:sp>
+        <p:nvSpPr>
+          <p:cNvPr id="8" name="TextBox 7">
+            <a:extLst>
+              <a:ext uri="{FF2B5EF4-FFF2-40B4-BE49-F238E27FC236}">
+                <a16:creationId xmlns:a16="http://schemas.microsoft.com/office/drawing/2014/main" id="{57819BF9-8FC3-4825-BC66-2BCCD99DBD00}"/>
+              </a:ext>
+            </a:extLst>
+          </p:cNvPr>
+          <p:cNvSpPr txBox="1"/>
+          <p:nvPr/>
+        </p:nvSpPr>
+        <p:spPr>
+          <a:xfrm>
+            <a:off x="322611" y="850297"/>
+            <a:ext cx="4958516" cy="3477875"/>
+          </a:xfrm>
+          <a:prstGeom prst="rect">
+            <a:avLst/>
+          </a:prstGeom>
+          <a:noFill/>
+        </p:spPr>
+        <p:txBody>
+          <a:bodyPr wrap="square" rtlCol="0">
+            <a:spAutoFit/>
+          </a:bodyPr>
+          <a:lstStyle/>
+          <a:p>
+            <a:pPr marL="342900" indent="-342900">
+              <a:buFont typeface="Arial" panose="020B0604020202020204" pitchFamily="34" charset="0"/>
+              <a:buChar char="•"/>
+            </a:pPr>
+            <a:r>
+              <a:rPr lang="en-US" sz="2000">
+                <a:latin typeface="Times New Roman" panose="02020603050405020304" pitchFamily="18" charset="0"/>
+                <a:cs typeface="Times New Roman" panose="02020603050405020304" pitchFamily="18" charset="0"/>
+              </a:rPr>
+              <a:t>Once you buy a token of a listing property, you now </a:t>
+            </a:r>
+            <a:r>
+              <a:rPr lang="en-US" sz="2000" b="1">
+                <a:latin typeface="Times New Roman" panose="02020603050405020304" pitchFamily="18" charset="0"/>
+                <a:cs typeface="Times New Roman" panose="02020603050405020304" pitchFamily="18" charset="0"/>
+              </a:rPr>
+              <a:t>have right to vote for that property’s decision</a:t>
+            </a:r>
+            <a:endParaRPr lang="en-US" sz="2000" b="1" dirty="0">
+              <a:latin typeface="Times New Roman" panose="02020603050405020304" pitchFamily="18" charset="0"/>
+              <a:cs typeface="Times New Roman" panose="02020603050405020304" pitchFamily="18" charset="0"/>
+            </a:endParaRPr>
+          </a:p>
+          <a:p>
+            <a:pPr marL="342900" indent="-342900">
+              <a:buFont typeface="Arial" panose="020B0604020202020204" pitchFamily="34" charset="0"/>
+              <a:buChar char="•"/>
+            </a:pPr>
+            <a:r>
+              <a:rPr lang="en-US" sz="2000">
+                <a:latin typeface="Times New Roman" panose="02020603050405020304" pitchFamily="18" charset="0"/>
+                <a:cs typeface="Times New Roman" panose="02020603050405020304" pitchFamily="18" charset="0"/>
+              </a:rPr>
+              <a:t>Vote on all </a:t>
+            </a:r>
+            <a:r>
+              <a:rPr lang="en-US" sz="2000" b="1">
+                <a:latin typeface="Times New Roman" panose="02020603050405020304" pitchFamily="18" charset="0"/>
+                <a:cs typeface="Times New Roman" panose="02020603050405020304" pitchFamily="18" charset="0"/>
+              </a:rPr>
+              <a:t>key decisions </a:t>
+            </a:r>
+            <a:r>
+              <a:rPr lang="en-US" sz="2000">
+                <a:latin typeface="Times New Roman" panose="02020603050405020304" pitchFamily="18" charset="0"/>
+                <a:cs typeface="Times New Roman" panose="02020603050405020304" pitchFamily="18" charset="0"/>
+              </a:rPr>
+              <a:t>such as: repair and maintenance, rent amount, eviction time for tenant,….</a:t>
+            </a:r>
+          </a:p>
+          <a:p>
+            <a:pPr marL="342900" indent="-342900">
+              <a:buFont typeface="Arial" panose="020B0604020202020204" pitchFamily="34" charset="0"/>
+              <a:buChar char="•"/>
+            </a:pPr>
+            <a:r>
+              <a:rPr lang="en-US" sz="2000">
+                <a:latin typeface="Times New Roman" panose="02020603050405020304" pitchFamily="18" charset="0"/>
+                <a:cs typeface="Times New Roman" panose="02020603050405020304" pitchFamily="18" charset="0"/>
+              </a:rPr>
+              <a:t>House changes </a:t>
+            </a:r>
+            <a:r>
+              <a:rPr lang="en-US" sz="2000" b="1">
+                <a:latin typeface="Times New Roman" panose="02020603050405020304" pitchFamily="18" charset="0"/>
+                <a:cs typeface="Times New Roman" panose="02020603050405020304" pitchFamily="18" charset="0"/>
+              </a:rPr>
+              <a:t>affect on all token investors </a:t>
+            </a:r>
+            <a:r>
+              <a:rPr lang="en-US" sz="2000">
+                <a:latin typeface="Times New Roman" panose="02020603050405020304" pitchFamily="18" charset="0"/>
+                <a:cs typeface="Times New Roman" panose="02020603050405020304" pitchFamily="18" charset="0"/>
+              </a:rPr>
+              <a:t>will be announced in public message board</a:t>
+            </a:r>
+            <a:endParaRPr lang="en-US" sz="2000" dirty="0">
+              <a:latin typeface="Times New Roman" panose="02020603050405020304" pitchFamily="18" charset="0"/>
+              <a:cs typeface="Times New Roman" panose="02020603050405020304" pitchFamily="18" charset="0"/>
+            </a:endParaRPr>
+          </a:p>
+          <a:p>
+            <a:r>
+              <a:rPr lang="en-US" sz="2000" b="1">
+                <a:latin typeface="Times New Roman" panose="02020603050405020304" pitchFamily="18" charset="0"/>
+                <a:cs typeface="Times New Roman" panose="02020603050405020304" pitchFamily="18" charset="0"/>
+              </a:rPr>
+              <a:t>=&gt; Empower ownership and increase transparency</a:t>
+            </a:r>
+            <a:endParaRPr lang="en-US" sz="2000" b="1" dirty="0">
+              <a:latin typeface="Times New Roman" panose="02020603050405020304" pitchFamily="18" charset="0"/>
+              <a:cs typeface="Times New Roman" panose="02020603050405020304" pitchFamily="18" charset="0"/>
+            </a:endParaRPr>
+          </a:p>
+        </p:txBody>
+      </p:sp>
+      <p:pic>
+        <p:nvPicPr>
+          <p:cNvPr id="1026" name="Picture 2">
+            <a:extLst>
+              <a:ext uri="{FF2B5EF4-FFF2-40B4-BE49-F238E27FC236}">
+                <a16:creationId xmlns:a16="http://schemas.microsoft.com/office/drawing/2014/main" id="{8BF123A2-2C28-40DE-9F6F-66971D9B3A2E}"/>
+              </a:ext>
+            </a:extLst>
+          </p:cNvPr>
+          <p:cNvPicPr>
+            <a:picLocks noChangeAspect="1" noChangeArrowheads="1"/>
+          </p:cNvPicPr>
+          <p:nvPr/>
+        </p:nvPicPr>
+        <p:blipFill>
+          <a:blip r:embed="rId2">
+            <a:extLst>
+              <a:ext uri="{28A0092B-C50C-407E-A947-70E740481C1C}">
+                <a14:useLocalDpi xmlns:a14="http://schemas.microsoft.com/office/drawing/2010/main" val="0"/>
+              </a:ext>
+            </a:extLst>
+          </a:blip>
+          <a:srcRect/>
+          <a:stretch>
+            <a:fillRect/>
+          </a:stretch>
+        </p:blipFill>
+        <p:spPr bwMode="auto">
+          <a:xfrm>
+            <a:off x="5822302" y="736458"/>
+            <a:ext cx="5693727" cy="5877397"/>
+          </a:xfrm>
+          <a:prstGeom prst="rect">
+            <a:avLst/>
+          </a:prstGeom>
+          <a:noFill/>
+          <a:extLst>
+            <a:ext uri="{909E8E84-426E-40DD-AFC4-6F175D3DCCD1}">
+              <a14:hiddenFill xmlns:a14="http://schemas.microsoft.com/office/drawing/2010/main">
+                <a:solidFill>
+                  <a:srgbClr val="FFFFFF"/>
+                </a:solidFill>
+              </a14:hiddenFill>
+            </a:ext>
+          </a:extLst>
+        </p:spPr>
+      </p:pic>
+    </p:spTree>
+    <p:extLst>
+      <p:ext uri="{BB962C8B-B14F-4D97-AF65-F5344CB8AC3E}">
+        <p14:creationId xmlns:p14="http://schemas.microsoft.com/office/powerpoint/2010/main" val="2973705428"/>
+      </p:ext>
+    </p:extLst>
+  </p:cSld>
+  <p:clrMapOvr>
+    <a:masterClrMapping/>
+  </p:clrMapOvr>
+</p:sld>
+</file>
+
+<file path=ppt/slides/slide11.xml><?xml version="1.0" encoding="utf-8"?>
+<p:sld xmlns:a="http://schemas.openxmlformats.org/drawingml/2006/main" xmlns:r="http://schemas.openxmlformats.org/officeDocument/2006/relationships" xmlns:p="http://schemas.openxmlformats.org/presentationml/2006/main">
+  <p:cSld>
+    <p:spTree>
+      <p:nvGrpSpPr>
+        <p:cNvPr id="1" name=""/>
+        <p:cNvGrpSpPr/>
+        <p:nvPr/>
+      </p:nvGrpSpPr>
+      <p:grpSpPr>
+        <a:xfrm>
+          <a:off x="0" y="0"/>
+          <a:ext cx="0" cy="0"/>
+          <a:chOff x="0" y="0"/>
+          <a:chExt cx="0" cy="0"/>
+        </a:xfrm>
+      </p:grpSpPr>
+      <p:pic>
+        <p:nvPicPr>
+          <p:cNvPr id="4" name="Picture 3">
+            <a:extLst>
+              <a:ext uri="{FF2B5EF4-FFF2-40B4-BE49-F238E27FC236}">
+                <a16:creationId xmlns:a16="http://schemas.microsoft.com/office/drawing/2014/main" id="{5C36C6AC-AB95-4794-8CB0-660AB9433211}"/>
+              </a:ext>
+            </a:extLst>
+          </p:cNvPr>
+          <p:cNvPicPr>
+            <a:picLocks noChangeAspect="1"/>
+          </p:cNvPicPr>
+          <p:nvPr/>
+        </p:nvPicPr>
+        <p:blipFill>
+          <a:blip r:embed="rId2"/>
+          <a:stretch>
+            <a:fillRect/>
+          </a:stretch>
+        </p:blipFill>
+        <p:spPr>
+          <a:xfrm>
+            <a:off x="335617" y="961051"/>
+            <a:ext cx="9568140" cy="5561045"/>
+          </a:xfrm>
+          <a:prstGeom prst="rect">
+            <a:avLst/>
+          </a:prstGeom>
+        </p:spPr>
+      </p:pic>
+      <p:sp>
+        <p:nvSpPr>
+          <p:cNvPr id="6" name="TextBox 5">
+            <a:extLst>
+              <a:ext uri="{FF2B5EF4-FFF2-40B4-BE49-F238E27FC236}">
+                <a16:creationId xmlns:a16="http://schemas.microsoft.com/office/drawing/2014/main" id="{5CDD2090-EC34-4F33-8FF5-CFD698FA370D}"/>
+              </a:ext>
+            </a:extLst>
+          </p:cNvPr>
+          <p:cNvSpPr txBox="1"/>
+          <p:nvPr/>
+        </p:nvSpPr>
+        <p:spPr>
+          <a:xfrm>
+            <a:off x="475576" y="233266"/>
+            <a:ext cx="6097554" cy="646331"/>
+          </a:xfrm>
+          <a:prstGeom prst="rect">
+            <a:avLst/>
+          </a:prstGeom>
+          <a:noFill/>
+        </p:spPr>
+        <p:txBody>
+          <a:bodyPr wrap="square">
+            <a:spAutoFit/>
+          </a:bodyPr>
+          <a:lstStyle/>
+          <a:p>
+            <a:pPr marL="342900" indent="-342900">
+              <a:buFont typeface="Arial" panose="020B0604020202020204" pitchFamily="34" charset="0"/>
+              <a:buChar char="•"/>
+            </a:pPr>
+            <a:r>
+              <a:rPr lang="en-US">
+                <a:latin typeface="Times New Roman" panose="02020603050405020304" pitchFamily="18" charset="0"/>
+                <a:cs typeface="Times New Roman" panose="02020603050405020304" pitchFamily="18" charset="0"/>
+              </a:rPr>
+              <a:t>Each voting poll created by token owner will have </a:t>
+            </a:r>
+            <a:r>
+              <a:rPr lang="en-US" b="1">
+                <a:latin typeface="Times New Roman" panose="02020603050405020304" pitchFamily="18" charset="0"/>
+                <a:cs typeface="Times New Roman" panose="02020603050405020304" pitchFamily="18" charset="0"/>
+              </a:rPr>
+              <a:t>discussion board </a:t>
+            </a:r>
+            <a:r>
+              <a:rPr lang="en-US">
+                <a:latin typeface="Times New Roman" panose="02020603050405020304" pitchFamily="18" charset="0"/>
+                <a:cs typeface="Times New Roman" panose="02020603050405020304" pitchFamily="18" charset="0"/>
+              </a:rPr>
+              <a:t>for transparency</a:t>
+            </a:r>
+            <a:endParaRPr lang="en-US" sz="1800" dirty="0">
+              <a:latin typeface="Times New Roman" panose="02020603050405020304" pitchFamily="18" charset="0"/>
+              <a:cs typeface="Times New Roman" panose="02020603050405020304" pitchFamily="18" charset="0"/>
+            </a:endParaRPr>
+          </a:p>
+        </p:txBody>
+      </p:sp>
+    </p:spTree>
+    <p:extLst>
+      <p:ext uri="{BB962C8B-B14F-4D97-AF65-F5344CB8AC3E}">
+        <p14:creationId xmlns:p14="http://schemas.microsoft.com/office/powerpoint/2010/main" val="3229141818"/>
+      </p:ext>
+    </p:extLst>
+  </p:cSld>
+  <p:clrMapOvr>
+    <a:masterClrMapping/>
+  </p:clrMapOvr>
+</p:sld>
+</file>
+
+<file path=ppt/slides/slide12.xml><?xml version="1.0" encoding="utf-8"?>
+<p:sld xmlns:a="http://schemas.openxmlformats.org/drawingml/2006/main" xmlns:r="http://schemas.openxmlformats.org/officeDocument/2006/relationships" xmlns:p="http://schemas.openxmlformats.org/presentationml/2006/main">
+  <p:cSld>
+    <p:spTree>
+      <p:nvGrpSpPr>
+        <p:cNvPr id="1" name=""/>
+        <p:cNvGrpSpPr/>
+        <p:nvPr/>
+      </p:nvGrpSpPr>
+      <p:grpSpPr>
+        <a:xfrm>
+          <a:off x="0" y="0"/>
+          <a:ext cx="0" cy="0"/>
+          <a:chOff x="0" y="0"/>
+          <a:chExt cx="0" cy="0"/>
+        </a:xfrm>
+      </p:grpSpPr>
+      <p:cxnSp>
+        <p:nvCxnSpPr>
+          <p:cNvPr id="6" name="Straight Connector 5">
+            <a:extLst>
+              <a:ext uri="{FF2B5EF4-FFF2-40B4-BE49-F238E27FC236}">
+                <a16:creationId xmlns:a16="http://schemas.microsoft.com/office/drawing/2014/main" id="{A4BAE138-F457-4F1B-82F2-E96AD7B7D9B7}"/>
+              </a:ext>
+            </a:extLst>
+          </p:cNvPr>
+          <p:cNvCxnSpPr>
+            <a:cxnSpLocks/>
+          </p:cNvCxnSpPr>
+          <p:nvPr/>
+        </p:nvCxnSpPr>
+        <p:spPr>
+          <a:xfrm>
+            <a:off x="357337" y="759607"/>
+            <a:ext cx="1092200" cy="0"/>
+          </a:xfrm>
+          <a:prstGeom prst="line">
+            <a:avLst/>
+          </a:prstGeom>
+          <a:ln w="57150">
+            <a:solidFill>
+              <a:srgbClr val="C00000"/>
+            </a:solidFill>
+          </a:ln>
+        </p:spPr>
+        <p:style>
+          <a:lnRef idx="1">
+            <a:schemeClr val="accent1"/>
+          </a:lnRef>
+          <a:fillRef idx="0">
+            <a:schemeClr val="accent1"/>
+          </a:fillRef>
+          <a:effectRef idx="0">
+            <a:schemeClr val="accent1"/>
+          </a:effectRef>
+          <a:fontRef idx="minor">
+            <a:schemeClr val="tx1"/>
+          </a:fontRef>
+        </p:style>
+      </p:cxnSp>
+      <p:sp>
+        <p:nvSpPr>
+          <p:cNvPr id="7" name="TextBox 6">
+            <a:extLst>
+              <a:ext uri="{FF2B5EF4-FFF2-40B4-BE49-F238E27FC236}">
+                <a16:creationId xmlns:a16="http://schemas.microsoft.com/office/drawing/2014/main" id="{B31E11F0-7240-4000-8CD9-CA32B8AA3B71}"/>
+              </a:ext>
+            </a:extLst>
+          </p:cNvPr>
+          <p:cNvSpPr txBox="1"/>
+          <p:nvPr/>
+        </p:nvSpPr>
+        <p:spPr>
+          <a:xfrm>
+            <a:off x="276314" y="267165"/>
+            <a:ext cx="8148320" cy="492443"/>
+          </a:xfrm>
+          <a:prstGeom prst="rect">
+            <a:avLst/>
+          </a:prstGeom>
+          <a:noFill/>
+        </p:spPr>
+        <p:txBody>
+          <a:bodyPr wrap="square" rtlCol="0">
+            <a:spAutoFit/>
+          </a:bodyPr>
+          <a:lstStyle/>
+          <a:p>
+            <a:r>
+              <a:rPr lang="en-US" sz="2600">
+                <a:latin typeface="Times New Roman" panose="02020603050405020304" pitchFamily="18" charset="0"/>
+                <a:cs typeface="Times New Roman" panose="02020603050405020304" pitchFamily="18" charset="0"/>
+              </a:rPr>
+              <a:t>Want to know more ?</a:t>
+            </a:r>
+            <a:endParaRPr lang="en-US" sz="2600" dirty="0">
+              <a:latin typeface="Times New Roman" panose="02020603050405020304" pitchFamily="18" charset="0"/>
+              <a:cs typeface="Times New Roman" panose="02020603050405020304" pitchFamily="18" charset="0"/>
+            </a:endParaRPr>
+          </a:p>
+        </p:txBody>
+      </p:sp>
+      <p:sp>
+        <p:nvSpPr>
+          <p:cNvPr id="8" name="TextBox 7">
+            <a:extLst>
+              <a:ext uri="{FF2B5EF4-FFF2-40B4-BE49-F238E27FC236}">
+                <a16:creationId xmlns:a16="http://schemas.microsoft.com/office/drawing/2014/main" id="{DE6DBDFD-2A32-4353-AD6D-A2E6C950EDA5}"/>
+              </a:ext>
+            </a:extLst>
+          </p:cNvPr>
+          <p:cNvSpPr txBox="1"/>
+          <p:nvPr/>
+        </p:nvSpPr>
+        <p:spPr>
+          <a:xfrm>
+            <a:off x="357337" y="924560"/>
+            <a:ext cx="6563360" cy="1477328"/>
+          </a:xfrm>
+          <a:prstGeom prst="rect">
+            <a:avLst/>
+          </a:prstGeom>
+          <a:noFill/>
+        </p:spPr>
+        <p:txBody>
+          <a:bodyPr wrap="square" rtlCol="0">
+            <a:spAutoFit/>
+          </a:bodyPr>
+          <a:lstStyle/>
+          <a:p>
+            <a:r>
+              <a:rPr lang="en-US"/>
+              <a:t>Check our folder, it will contain</a:t>
+            </a:r>
+          </a:p>
+          <a:p>
+            <a:pPr marL="285750" indent="-285750">
+              <a:buFont typeface="Arial" panose="020B0604020202020204" pitchFamily="34" charset="0"/>
+              <a:buChar char="•"/>
+            </a:pPr>
+            <a:r>
+              <a:rPr lang="en-US"/>
+              <a:t>Lofty_introduction_platform: a introduction to Lofty platform for you to know more. Because our system is based on it</a:t>
+            </a:r>
+          </a:p>
+          <a:p>
+            <a:pPr marL="285750" indent="-285750">
+              <a:buFont typeface="Arial" panose="020B0604020202020204" pitchFamily="34" charset="0"/>
+              <a:buChar char="•"/>
+            </a:pPr>
+            <a:r>
+              <a:rPr lang="en-US"/>
+              <a:t>real_estate_poc_erd: </a:t>
+            </a:r>
+            <a:r>
+              <a:rPr lang="en-US" b="1"/>
+              <a:t>A proof of concept</a:t>
+            </a:r>
+            <a:r>
+              <a:rPr lang="en-US"/>
+              <a:t> of system’s ERD. Our system will store all transaction tables in </a:t>
+            </a:r>
+            <a:r>
+              <a:rPr lang="en-US" b="1"/>
+              <a:t>Hyperledger Fabric</a:t>
+            </a:r>
+          </a:p>
+        </p:txBody>
+      </p:sp>
+      <p:pic>
+        <p:nvPicPr>
+          <p:cNvPr id="3074" name="Picture 2" descr="Human Resources / Informational Links for All">
+            <a:extLst>
+              <a:ext uri="{FF2B5EF4-FFF2-40B4-BE49-F238E27FC236}">
+                <a16:creationId xmlns:a16="http://schemas.microsoft.com/office/drawing/2014/main" id="{C20292E1-40C1-4620-94BA-982AC76193AD}"/>
+              </a:ext>
+            </a:extLst>
+          </p:cNvPr>
+          <p:cNvPicPr>
+            <a:picLocks noChangeAspect="1" noChangeArrowheads="1"/>
+          </p:cNvPicPr>
+          <p:nvPr/>
+        </p:nvPicPr>
+        <p:blipFill>
+          <a:blip r:embed="rId2">
+            <a:extLst>
+              <a:ext uri="{28A0092B-C50C-407E-A947-70E740481C1C}">
+                <a14:useLocalDpi xmlns:a14="http://schemas.microsoft.com/office/drawing/2010/main" val="0"/>
+              </a:ext>
+            </a:extLst>
+          </a:blip>
+          <a:srcRect/>
+          <a:stretch>
+            <a:fillRect/>
+          </a:stretch>
+        </p:blipFill>
+        <p:spPr bwMode="auto">
+          <a:xfrm>
+            <a:off x="520154" y="3068320"/>
+            <a:ext cx="5945431" cy="3692140"/>
+          </a:xfrm>
+          <a:prstGeom prst="rect">
+            <a:avLst/>
+          </a:prstGeom>
+          <a:noFill/>
+          <a:extLst>
+            <a:ext uri="{909E8E84-426E-40DD-AFC4-6F175D3DCCD1}">
+              <a14:hiddenFill xmlns:a14="http://schemas.microsoft.com/office/drawing/2010/main">
+                <a:solidFill>
+                  <a:srgbClr val="FFFFFF"/>
+                </a:solidFill>
+              </a14:hiddenFill>
+            </a:ext>
+          </a:extLst>
+        </p:spPr>
+      </p:pic>
+      <p:sp>
+        <p:nvSpPr>
+          <p:cNvPr id="9" name="TextBox 8">
+            <a:extLst>
+              <a:ext uri="{FF2B5EF4-FFF2-40B4-BE49-F238E27FC236}">
+                <a16:creationId xmlns:a16="http://schemas.microsoft.com/office/drawing/2014/main" id="{05489520-47BE-42CC-912C-C4BAD47EC87C}"/>
+              </a:ext>
+            </a:extLst>
+          </p:cNvPr>
+          <p:cNvSpPr txBox="1"/>
+          <p:nvPr/>
+        </p:nvSpPr>
+        <p:spPr>
+          <a:xfrm>
+            <a:off x="357337" y="2608036"/>
+            <a:ext cx="7764411" cy="369332"/>
+          </a:xfrm>
+          <a:prstGeom prst="rect">
+            <a:avLst/>
+          </a:prstGeom>
+          <a:noFill/>
+        </p:spPr>
+        <p:txBody>
+          <a:bodyPr wrap="square">
+            <a:spAutoFit/>
+          </a:bodyPr>
+          <a:lstStyle/>
+          <a:p>
+            <a:r>
+              <a:rPr lang="en-US">
+                <a:hlinkClick r:id="rId3"/>
+              </a:rPr>
+              <a:t>VinhQuocTran/finalterm_real_estate_blockchain (github.com)</a:t>
+            </a:r>
+            <a:endParaRPr lang="en-US"/>
+          </a:p>
+        </p:txBody>
+      </p:sp>
+    </p:spTree>
+    <p:extLst>
+      <p:ext uri="{BB962C8B-B14F-4D97-AF65-F5344CB8AC3E}">
+        <p14:creationId xmlns:p14="http://schemas.microsoft.com/office/powerpoint/2010/main" val="1761510605"/>
+      </p:ext>
+    </p:extLst>
+  </p:cSld>
+  <p:clrMapOvr>
+    <a:masterClrMapping/>
+  </p:clrMapOvr>
+</p:sld>
+</file>
+
 <file path=ppt/slides/slide2.xml><?xml version="1.0" encoding="utf-8"?>
 <p:sld xmlns:a="http://schemas.openxmlformats.org/drawingml/2006/main" xmlns:r="http://schemas.openxmlformats.org/officeDocument/2006/relationships" xmlns:p="http://schemas.openxmlformats.org/presentationml/2006/main">
   <p:cSld>
@@ -3913,7 +5110,7 @@
               <a:buChar char="•"/>
             </a:pPr>
             <a:r>
-              <a:rPr lang="en-US" sz="2000" b="0" i="0" dirty="0">
+              <a:rPr lang="en-US" sz="2000" b="0" i="0">
                 <a:solidFill>
                   <a:srgbClr val="000000"/>
                 </a:solidFill>
@@ -3929,7 +5126,7 @@
               <a:buChar char="•"/>
             </a:pPr>
             <a:r>
-              <a:rPr lang="en-US" sz="2000" dirty="0">
+              <a:rPr lang="en-US" sz="2000">
                 <a:solidFill>
                   <a:srgbClr val="000000"/>
                 </a:solidFill>
@@ -3944,8 +5141,12 @@
               <a:buChar char="•"/>
             </a:pPr>
             <a:r>
+              <a:rPr lang="en-US" sz="2000"/>
+              <a:t>Notary </a:t>
+            </a:r>
+            <a:r>
               <a:rPr lang="en-US" sz="2000" dirty="0"/>
-              <a:t>Notary (witness service)</a:t>
+              <a:t>(witness service)</a:t>
             </a:r>
           </a:p>
           <a:p>
@@ -3965,8 +5166,13 @@
             </a:pPr>
             <a:r>
               <a:rPr lang="en-US" sz="2000" dirty="0"/>
-              <a:t>House Inspection/Valuation</a:t>
-            </a:r>
+              <a:t>House Inspection</a:t>
+            </a:r>
+            <a:r>
+              <a:rPr lang="en-US" sz="2000"/>
+              <a:t>/Valuation service</a:t>
+            </a:r>
+            <a:endParaRPr lang="en-US" sz="2000" dirty="0"/>
           </a:p>
           <a:p>
             <a:pPr marL="342900" indent="-342900">
@@ -4210,7 +5416,7 @@
               <a:buChar char="•"/>
             </a:pPr>
             <a:r>
-              <a:rPr lang="en-US" sz="2000" b="1" dirty="0">
+              <a:rPr lang="en-US" sz="2000" b="1">
                 <a:solidFill>
                   <a:srgbClr val="000000"/>
                 </a:solidFill>
@@ -4220,6 +5426,48 @@
               <a:t>Seller</a:t>
             </a:r>
             <a:r>
+              <a:rPr lang="en-US" sz="2000">
+                <a:solidFill>
+                  <a:srgbClr val="000000"/>
+                </a:solidFill>
+                <a:latin typeface="Times New Roman" panose="02020603050405020304" pitchFamily="18" charset="0"/>
+                <a:cs typeface="Times New Roman" panose="02020603050405020304" pitchFamily="18" charset="0"/>
+              </a:rPr>
+              <a:t>: a professional in the real estate market with a lot of tools and insider data like:</a:t>
+            </a:r>
+          </a:p>
+          <a:p>
+            <a:pPr marL="800100" lvl="1" indent="-342900">
+              <a:buFont typeface="Arial" panose="020B0604020202020204" pitchFamily="34" charset="0"/>
+              <a:buChar char="•"/>
+            </a:pPr>
+            <a:r>
+              <a:rPr lang="en-US" sz="2000">
+                <a:solidFill>
+                  <a:srgbClr val="000000"/>
+                </a:solidFill>
+                <a:latin typeface="Times New Roman" panose="02020603050405020304" pitchFamily="18" charset="0"/>
+                <a:cs typeface="Times New Roman" panose="02020603050405020304" pitchFamily="18" charset="0"/>
+              </a:rPr>
+              <a:t>Knowledge of the property</a:t>
+            </a:r>
+          </a:p>
+          <a:p>
+            <a:pPr marL="800100" lvl="1" indent="-342900">
+              <a:buFont typeface="Arial" panose="020B0604020202020204" pitchFamily="34" charset="0"/>
+              <a:buChar char="•"/>
+            </a:pPr>
+            <a:r>
+              <a:rPr lang="en-US" sz="2000">
+                <a:solidFill>
+                  <a:srgbClr val="000000"/>
+                </a:solidFill>
+                <a:latin typeface="Times New Roman" panose="02020603050405020304" pitchFamily="18" charset="0"/>
+                <a:cs typeface="Times New Roman" panose="02020603050405020304" pitchFamily="18" charset="0"/>
+              </a:rPr>
+              <a:t>Market </a:t>
+            </a:r>
+            <a:r>
               <a:rPr lang="en-US" sz="2000" dirty="0">
                 <a:solidFill>
                   <a:srgbClr val="000000"/>
@@ -4227,39 +5475,7 @@
                 <a:latin typeface="Times New Roman" panose="02020603050405020304" pitchFamily="18" charset="0"/>
                 <a:cs typeface="Times New Roman" panose="02020603050405020304" pitchFamily="18" charset="0"/>
               </a:rPr>
-              <a:t>: a professional in the real estate market with a lot of tools and insider data like:</a:t>
-            </a:r>
-          </a:p>
-          <a:p>
-            <a:pPr marL="800100" lvl="1" indent="-342900">
-              <a:buFont typeface="Arial" panose="020B0604020202020204" pitchFamily="34" charset="0"/>
-              <a:buChar char="•"/>
-            </a:pPr>
-            <a:r>
-              <a:rPr lang="en-US" sz="2000" dirty="0">
-                <a:solidFill>
-                  <a:srgbClr val="000000"/>
-                </a:solidFill>
-                <a:latin typeface="Times New Roman" panose="02020603050405020304" pitchFamily="18" charset="0"/>
-                <a:cs typeface="Times New Roman" panose="02020603050405020304" pitchFamily="18" charset="0"/>
-              </a:rPr>
-              <a:t>Knowledge of the property</a:t>
-            </a:r>
-          </a:p>
-          <a:p>
-            <a:pPr marL="800100" lvl="1" indent="-342900">
-              <a:buFont typeface="Arial" panose="020B0604020202020204" pitchFamily="34" charset="0"/>
-              <a:buChar char="•"/>
-            </a:pPr>
-            <a:r>
-              <a:rPr lang="en-US" sz="2000" dirty="0">
-                <a:solidFill>
-                  <a:srgbClr val="000000"/>
-                </a:solidFill>
-                <a:latin typeface="Times New Roman" panose="02020603050405020304" pitchFamily="18" charset="0"/>
-                <a:cs typeface="Times New Roman" panose="02020603050405020304" pitchFamily="18" charset="0"/>
-              </a:rPr>
-              <a:t>Market Trends and Conditions</a:t>
+              <a:t>Trends and Conditions</a:t>
             </a:r>
           </a:p>
           <a:p>
@@ -5023,7 +6239,7 @@
           <p:nvPr>
             <p:extLst>
               <p:ext uri="{D42A27DB-BD31-4B8C-83A1-F6EECF244321}">
-                <p14:modId xmlns:p14="http://schemas.microsoft.com/office/powerpoint/2010/main" val="214828282"/>
+                <p14:modId xmlns:p14="http://schemas.microsoft.com/office/powerpoint/2010/main" val="419442151"/>
               </p:ext>
             </p:extLst>
           </p:nvPr>
@@ -5036,7 +6252,7 @@
           <a:graphicData uri="http://schemas.openxmlformats.org/drawingml/2006/table">
             <a:tbl>
               <a:tblPr firstRow="1" bandRow="1">
-                <a:tableStyleId>{5C22544A-7EE6-4342-B048-85BDC9FD1C3A}</a:tableStyleId>
+                <a:tableStyleId>{5A111915-BE36-4E01-A7E5-04B1672EAD32}</a:tableStyleId>
               </a:tblPr>
               <a:tblGrid>
                 <a:gridCol w="2709333">
@@ -5157,14 +6373,11 @@
                     <a:lstStyle/>
                     <a:p>
                       <a:r>
-                        <a:rPr lang="en-US" sz="1800" b="0" i="0" kern="1200">
+                        <a:rPr lang="en-US" sz="1800" b="0" kern="1200">
                           <a:solidFill>
                             <a:schemeClr val="dk1"/>
                           </a:solidFill>
                           <a:effectLst/>
-                          <a:latin typeface="+mn-lt"/>
-                          <a:ea typeface="+mn-ea"/>
-                          <a:cs typeface="+mn-cs"/>
                         </a:rPr>
                         <a:t>Agent Commissions</a:t>
                       </a:r>
@@ -5186,14 +6399,11 @@
                     <a:lstStyle/>
                     <a:p>
                       <a:r>
-                        <a:rPr lang="en-US" sz="1800" b="0" i="0" kern="1200">
+                        <a:rPr lang="en-US" sz="1800" b="0" kern="1200">
                           <a:solidFill>
                             <a:schemeClr val="dk1"/>
                           </a:solidFill>
                           <a:effectLst/>
-                          <a:latin typeface="+mn-lt"/>
-                          <a:ea typeface="+mn-ea"/>
-                          <a:cs typeface="+mn-cs"/>
                         </a:rPr>
                         <a:t>Home Inspection service</a:t>
                       </a:r>
@@ -5218,14 +6428,11 @@
                     <a:lstStyle/>
                     <a:p>
                       <a:r>
-                        <a:rPr lang="en-US" sz="1800" b="0" i="0" kern="1200">
+                        <a:rPr lang="en-US" sz="1800" b="0" kern="1200">
                           <a:solidFill>
                             <a:schemeClr val="dk1"/>
                           </a:solidFill>
                           <a:effectLst/>
-                          <a:latin typeface="+mn-lt"/>
-                          <a:ea typeface="+mn-ea"/>
-                          <a:cs typeface="+mn-cs"/>
                         </a:rPr>
                         <a:t>Home Repairs and Staging</a:t>
                       </a:r>
@@ -5264,14 +6471,11 @@
                         <a:defRPr/>
                       </a:pPr>
                       <a:r>
-                        <a:rPr lang="en-US" sz="1800" b="0" i="0" kern="1200">
+                        <a:rPr lang="en-US" sz="1800" b="0" kern="1200">
                           <a:solidFill>
                             <a:schemeClr val="dk1"/>
                           </a:solidFill>
                           <a:effectLst/>
-                          <a:latin typeface="+mn-lt"/>
-                          <a:ea typeface="+mn-ea"/>
-                          <a:cs typeface="+mn-cs"/>
                         </a:rPr>
                         <a:t>Home Valuation service</a:t>
                       </a:r>
@@ -5296,14 +6500,11 @@
                     <a:lstStyle/>
                     <a:p>
                       <a:r>
-                        <a:rPr lang="en-US" sz="1800" b="0" i="0" kern="1200">
+                        <a:rPr lang="en-US" sz="1800" b="0" kern="1200">
                           <a:solidFill>
                             <a:schemeClr val="dk1"/>
                           </a:solidFill>
                           <a:effectLst/>
-                          <a:latin typeface="+mn-lt"/>
-                          <a:ea typeface="+mn-ea"/>
-                          <a:cs typeface="+mn-cs"/>
                         </a:rPr>
                         <a:t>Transfer Taxes</a:t>
                       </a:r>
@@ -5325,14 +6526,11 @@
                     <a:lstStyle/>
                     <a:p>
                       <a:r>
-                        <a:rPr lang="en-US" sz="1800" b="0" i="0" kern="1200">
+                        <a:rPr lang="en-US" sz="1800" b="0" kern="1200">
                           <a:solidFill>
                             <a:schemeClr val="dk1"/>
                           </a:solidFill>
                           <a:effectLst/>
-                          <a:latin typeface="+mn-lt"/>
-                          <a:ea typeface="+mn-ea"/>
-                          <a:cs typeface="+mn-cs"/>
                         </a:rPr>
                         <a:t>Earnest Money</a:t>
                       </a:r>
@@ -5637,8 +6835,8 @@
         </p:nvSpPr>
         <p:spPr>
           <a:xfrm>
-            <a:off x="76200" y="1693113"/>
-            <a:ext cx="6019800" cy="4708981"/>
+            <a:off x="150845" y="1865833"/>
+            <a:ext cx="5055637" cy="2862322"/>
           </a:xfrm>
           <a:prstGeom prst="rect">
             <a:avLst/>
@@ -5685,69 +6883,7 @@
             </a:r>
             <a:r>
               <a:rPr lang="en-US" sz="2000"/>
-              <a:t>. The Lofty platform is introduced in 2020 using Algorand blockchain as a backbone for transaction</a:t>
-            </a:r>
-          </a:p>
-          <a:p>
-            <a:pPr marL="342900" indent="-342900">
-              <a:buFont typeface="Arial" panose="020B0604020202020204" pitchFamily="34" charset="0"/>
-              <a:buChar char="•"/>
-            </a:pPr>
-            <a:r>
-              <a:rPr lang="en-US" sz="2000"/>
-              <a:t>The advantages of our new system can bring to CRE is</a:t>
-            </a:r>
-          </a:p>
-          <a:p>
-            <a:pPr marL="800100" lvl="1" indent="-342900">
-              <a:buFont typeface="Arial" panose="020B0604020202020204" pitchFamily="34" charset="0"/>
-              <a:buChar char="•"/>
-            </a:pPr>
-            <a:r>
-              <a:rPr lang="en-US" sz="2000"/>
-              <a:t>Low entry cost thanks to </a:t>
-            </a:r>
-            <a:r>
-              <a:rPr lang="en-US" sz="2000" b="1"/>
-              <a:t>house tokenization</a:t>
-            </a:r>
-          </a:p>
-          <a:p>
-            <a:pPr marL="800100" lvl="1" indent="-342900">
-              <a:buFont typeface="Arial" panose="020B0604020202020204" pitchFamily="34" charset="0"/>
-              <a:buChar char="•"/>
-            </a:pPr>
-            <a:r>
-              <a:rPr lang="en-US" sz="2000"/>
-              <a:t>All house related documents is public on website so it’s total transparency</a:t>
-            </a:r>
-          </a:p>
-          <a:p>
-            <a:pPr marL="800100" lvl="1" indent="-342900">
-              <a:buFont typeface="Arial" panose="020B0604020202020204" pitchFamily="34" charset="0"/>
-              <a:buChar char="•"/>
-            </a:pPr>
-            <a:r>
-              <a:rPr lang="en-US" sz="2000"/>
-              <a:t>Transaction is </a:t>
-            </a:r>
-            <a:r>
-              <a:rPr lang="en-US" sz="2000" b="1"/>
-              <a:t>stored on blockchain </a:t>
-            </a:r>
-            <a:r>
-              <a:rPr lang="en-US" sz="2000"/>
-              <a:t>=&gt; immutable and prevent fraud</a:t>
-            </a:r>
-          </a:p>
-          <a:p>
-            <a:pPr marL="800100" lvl="1" indent="-342900">
-              <a:buFont typeface="Arial" panose="020B0604020202020204" pitchFamily="34" charset="0"/>
-              <a:buChar char="•"/>
-            </a:pPr>
-            <a:r>
-              <a:rPr lang="en-US" sz="2000"/>
-              <a:t>NO MORE PAPERWORK thanks to smart contract</a:t>
+              <a:t>. The Lofty platform is introduced in 2020 using Algorand blockchain as a backbone for transactions</a:t>
             </a:r>
           </a:p>
         </p:txBody>
@@ -5781,8 +6917,8 @@
         </p:blipFill>
         <p:spPr bwMode="auto">
           <a:xfrm>
-            <a:off x="6096001" y="1865833"/>
-            <a:ext cx="6095999" cy="3068637"/>
+            <a:off x="5413830" y="1865833"/>
+            <a:ext cx="6627325" cy="3336099"/>
           </a:xfrm>
           <a:prstGeom prst="rect">
             <a:avLst/>
@@ -5831,10 +6967,10 @@
       </p:grpSpPr>
       <p:cxnSp>
         <p:nvCxnSpPr>
-          <p:cNvPr id="4" name="Straight Connector 3">
-            <a:extLst>
-              <a:ext uri="{FF2B5EF4-FFF2-40B4-BE49-F238E27FC236}">
-                <a16:creationId xmlns:a16="http://schemas.microsoft.com/office/drawing/2014/main" id="{FD8945C5-D086-40AE-855A-DE1E0C847B8B}"/>
+          <p:cNvPr id="7" name="Straight Connector 6">
+            <a:extLst>
+              <a:ext uri="{FF2B5EF4-FFF2-40B4-BE49-F238E27FC236}">
+                <a16:creationId xmlns:a16="http://schemas.microsoft.com/office/drawing/2014/main" id="{387EA439-63F0-4B5C-9F69-4C78AC894323}"/>
               </a:ext>
             </a:extLst>
           </p:cNvPr>
@@ -5874,10 +7010,10 @@
       </p:cxnSp>
       <p:sp>
         <p:nvSpPr>
-          <p:cNvPr id="5" name="TextBox 4">
-            <a:extLst>
-              <a:ext uri="{FF2B5EF4-FFF2-40B4-BE49-F238E27FC236}">
-                <a16:creationId xmlns:a16="http://schemas.microsoft.com/office/drawing/2014/main" id="{48F65BD5-DBA0-40D9-8CC7-2E2E5678ECE2}"/>
+          <p:cNvPr id="8" name="TextBox 7">
+            <a:extLst>
+              <a:ext uri="{FF2B5EF4-FFF2-40B4-BE49-F238E27FC236}">
+                <a16:creationId xmlns:a16="http://schemas.microsoft.com/office/drawing/2014/main" id="{7605B279-0E6E-4167-823B-CB75E27450E4}"/>
               </a:ext>
             </a:extLst>
           </p:cNvPr>
@@ -5886,8 +7022,8 @@
         </p:nvSpPr>
         <p:spPr>
           <a:xfrm>
-            <a:off x="322612" y="244016"/>
-            <a:ext cx="8148320" cy="492443"/>
+            <a:off x="346432" y="244015"/>
+            <a:ext cx="8148320" cy="523220"/>
           </a:xfrm>
           <a:prstGeom prst="rect">
             <a:avLst/>
@@ -5901,61 +7037,38 @@
           <a:lstStyle/>
           <a:p>
             <a:r>
-              <a:rPr lang="en-US" sz="2600" dirty="0">
+              <a:rPr lang="en-US" sz="2600">
                 <a:latin typeface="Times New Roman" panose="02020603050405020304" pitchFamily="18" charset="0"/>
                 <a:cs typeface="Times New Roman" panose="02020603050405020304" pitchFamily="18" charset="0"/>
               </a:rPr>
-              <a:t>House tokenization</a:t>
-            </a:r>
-          </a:p>
-        </p:txBody>
-      </p:sp>
-      <p:pic>
-        <p:nvPicPr>
-          <p:cNvPr id="7" name="Picture 6">
-            <a:extLst>
-              <a:ext uri="{FF2B5EF4-FFF2-40B4-BE49-F238E27FC236}">
-                <a16:creationId xmlns:a16="http://schemas.microsoft.com/office/drawing/2014/main" id="{EB46A7EC-540A-4709-89DC-62F46F440CF2}"/>
-              </a:ext>
-            </a:extLst>
-          </p:cNvPr>
-          <p:cNvPicPr>
-            <a:picLocks noChangeAspect="1"/>
-          </p:cNvPicPr>
+              <a:t>Advantages of </a:t>
+            </a:r>
+            <a:r>
+              <a:rPr lang="en-US" sz="2800">
+                <a:latin typeface="Times New Roman" panose="02020603050405020304" pitchFamily="18" charset="0"/>
+                <a:cs typeface="Times New Roman" panose="02020603050405020304" pitchFamily="18" charset="0"/>
+              </a:rPr>
+              <a:t>Blockchain-based CRE </a:t>
+            </a:r>
+          </a:p>
+        </p:txBody>
+      </p:sp>
+      <p:sp>
+        <p:nvSpPr>
+          <p:cNvPr id="10" name="TextBox 9">
+            <a:extLst>
+              <a:ext uri="{FF2B5EF4-FFF2-40B4-BE49-F238E27FC236}">
+                <a16:creationId xmlns:a16="http://schemas.microsoft.com/office/drawing/2014/main" id="{598282C7-CD29-4E9C-8C67-FA044726468F}"/>
+              </a:ext>
+            </a:extLst>
+          </p:cNvPr>
+          <p:cNvSpPr txBox="1"/>
           <p:nvPr/>
-        </p:nvPicPr>
-        <p:blipFill>
-          <a:blip r:embed="rId2"/>
-          <a:stretch>
-            <a:fillRect/>
-          </a:stretch>
-        </p:blipFill>
+        </p:nvSpPr>
         <p:spPr>
           <a:xfrm>
-            <a:off x="322611" y="2523264"/>
-            <a:ext cx="11409750" cy="4090720"/>
-          </a:xfrm>
-          <a:prstGeom prst="rect">
-            <a:avLst/>
-          </a:prstGeom>
-        </p:spPr>
-      </p:pic>
-      <p:sp>
-        <p:nvSpPr>
-          <p:cNvPr id="8" name="TextBox 7">
-            <a:extLst>
-              <a:ext uri="{FF2B5EF4-FFF2-40B4-BE49-F238E27FC236}">
-                <a16:creationId xmlns:a16="http://schemas.microsoft.com/office/drawing/2014/main" id="{57819BF9-8FC3-4825-BC66-2BCCD99DBD00}"/>
-              </a:ext>
-            </a:extLst>
-          </p:cNvPr>
-          <p:cNvSpPr txBox="1"/>
-          <p:nvPr/>
-        </p:nvSpPr>
-        <p:spPr>
-          <a:xfrm>
-            <a:off x="322611" y="850297"/>
-            <a:ext cx="9409217" cy="1323439"/>
+            <a:off x="403635" y="859569"/>
+            <a:ext cx="6097554" cy="369332"/>
           </a:xfrm>
           <a:prstGeom prst="rect">
             <a:avLst/>
@@ -5963,7 +7076,7 @@
           <a:noFill/>
         </p:spPr>
         <p:txBody>
-          <a:bodyPr wrap="square" rtlCol="0">
+          <a:bodyPr wrap="square">
             <a:spAutoFit/>
           </a:bodyPr>
           <a:lstStyle/>
@@ -5973,59 +7086,420 @@
               <a:buChar char="•"/>
             </a:pPr>
             <a:r>
-              <a:rPr lang="en-US" sz="2000" dirty="0">
-                <a:latin typeface="Times New Roman" panose="02020603050405020304" pitchFamily="18" charset="0"/>
-                <a:cs typeface="Times New Roman" panose="02020603050405020304" pitchFamily="18" charset="0"/>
-              </a:rPr>
-              <a:t>A method that can enable investors to </a:t>
-            </a:r>
-            <a:r>
-              <a:rPr lang="en-US" sz="2000" b="1" dirty="0">
-                <a:latin typeface="Times New Roman" panose="02020603050405020304" pitchFamily="18" charset="0"/>
-                <a:cs typeface="Times New Roman" panose="02020603050405020304" pitchFamily="18" charset="0"/>
-              </a:rPr>
-              <a:t>own fractional ownership in a property</a:t>
-            </a:r>
-          </a:p>
-          <a:p>
-            <a:pPr marL="342900" indent="-342900">
-              <a:buFont typeface="Arial" panose="020B0604020202020204" pitchFamily="34" charset="0"/>
-              <a:buChar char="•"/>
-            </a:pPr>
-            <a:r>
-              <a:rPr lang="en-US" sz="2000" dirty="0">
-                <a:latin typeface="Times New Roman" panose="02020603050405020304" pitchFamily="18" charset="0"/>
-                <a:cs typeface="Times New Roman" panose="02020603050405020304" pitchFamily="18" charset="0"/>
-              </a:rPr>
-              <a:t>The process of issuing tokens may take a form of the IPO applied in the stock market</a:t>
-            </a:r>
-          </a:p>
-          <a:p>
-            <a:pPr marL="342900" indent="-342900">
-              <a:buFont typeface="Arial" panose="020B0604020202020204" pitchFamily="34" charset="0"/>
-              <a:buChar char="•"/>
-            </a:pPr>
-            <a:r>
-              <a:rPr lang="en-US" sz="2000" dirty="0">
-                <a:latin typeface="Times New Roman" panose="02020603050405020304" pitchFamily="18" charset="0"/>
-                <a:cs typeface="Times New Roman" panose="02020603050405020304" pitchFamily="18" charset="0"/>
-              </a:rPr>
-              <a:t>The owner of the property may issue tokens based on the market value of the property and sell them to potential investors </a:t>
-            </a:r>
-            <a:r>
-              <a:rPr lang="en-US" sz="2000" b="1" dirty="0">
-                <a:latin typeface="Times New Roman" panose="02020603050405020304" pitchFamily="18" charset="0"/>
-                <a:cs typeface="Times New Roman" panose="02020603050405020304" pitchFamily="18" charset="0"/>
-              </a:rPr>
-              <a:t>just like shares in a company</a:t>
-            </a:r>
-          </a:p>
-        </p:txBody>
-      </p:sp>
+              <a:rPr lang="en-US" sz="1800"/>
+              <a:t>The advantages of our new system can bring to CRE is</a:t>
+            </a:r>
+          </a:p>
+        </p:txBody>
+      </p:sp>
+      <p:graphicFrame>
+        <p:nvGraphicFramePr>
+          <p:cNvPr id="13" name="Table 10">
+            <a:extLst>
+              <a:ext uri="{FF2B5EF4-FFF2-40B4-BE49-F238E27FC236}">
+                <a16:creationId xmlns:a16="http://schemas.microsoft.com/office/drawing/2014/main" id="{213E7D1D-EA84-4BB5-9EDD-6573DDCC39F1}"/>
+              </a:ext>
+            </a:extLst>
+          </p:cNvPr>
+          <p:cNvGraphicFramePr>
+            <a:graphicFrameLocks noGrp="1"/>
+          </p:cNvGraphicFramePr>
+          <p:nvPr>
+            <p:extLst>
+              <p:ext uri="{D42A27DB-BD31-4B8C-83A1-F6EECF244321}">
+                <p14:modId xmlns:p14="http://schemas.microsoft.com/office/powerpoint/2010/main" val="3047196568"/>
+              </p:ext>
+            </p:extLst>
+          </p:nvPr>
+        </p:nvGraphicFramePr>
+        <p:xfrm>
+          <a:off x="346431" y="1352011"/>
+          <a:ext cx="9711969" cy="3403600"/>
+        </p:xfrm>
+        <a:graphic>
+          <a:graphicData uri="http://schemas.openxmlformats.org/drawingml/2006/table">
+            <a:tbl>
+              <a:tblPr firstRow="1" bandRow="1">
+                <a:tableStyleId>{5A111915-BE36-4E01-A7E5-04B1672EAD32}</a:tableStyleId>
+              </a:tblPr>
+              <a:tblGrid>
+                <a:gridCol w="5805974">
+                  <a:extLst>
+                    <a:ext uri="{9D8B030D-6E8A-4147-A177-3AD203B41FA5}">
+                      <a16:colId xmlns:a16="http://schemas.microsoft.com/office/drawing/2014/main" val="101365878"/>
+                    </a:ext>
+                  </a:extLst>
+                </a:gridCol>
+                <a:gridCol w="3905995">
+                  <a:extLst>
+                    <a:ext uri="{9D8B030D-6E8A-4147-A177-3AD203B41FA5}">
+                      <a16:colId xmlns:a16="http://schemas.microsoft.com/office/drawing/2014/main" val="767797195"/>
+                    </a:ext>
+                  </a:extLst>
+                </a:gridCol>
+              </a:tblGrid>
+              <a:tr h="370840">
+                <a:tc>
+                  <a:txBody>
+                    <a:bodyPr/>
+                    <a:lstStyle/>
+                    <a:p>
+                      <a:r>
+                        <a:rPr lang="en-US"/>
+                        <a:t>Advantage</a:t>
+                      </a:r>
+                    </a:p>
+                  </a:txBody>
+                  <a:tcPr/>
+                </a:tc>
+                <a:tc>
+                  <a:txBody>
+                    <a:bodyPr/>
+                    <a:lstStyle/>
+                    <a:p>
+                      <a:r>
+                        <a:rPr lang="en-US"/>
+                        <a:t>Tool</a:t>
+                      </a:r>
+                    </a:p>
+                  </a:txBody>
+                  <a:tcPr/>
+                </a:tc>
+                <a:extLst>
+                  <a:ext uri="{0D108BD9-81ED-4DB2-BD59-A6C34878D82A}">
+                    <a16:rowId xmlns:a16="http://schemas.microsoft.com/office/drawing/2014/main" val="1099334406"/>
+                  </a:ext>
+                </a:extLst>
+              </a:tr>
+              <a:tr h="370840">
+                <a:tc>
+                  <a:txBody>
+                    <a:bodyPr/>
+                    <a:lstStyle/>
+                    <a:p>
+                      <a:r>
+                        <a:rPr lang="en-US" sz="1800"/>
+                        <a:t>Low entry cost/high liquidity thanks to </a:t>
+                      </a:r>
+                      <a:r>
+                        <a:rPr lang="en-US" sz="1800" b="1"/>
+                        <a:t>house tokenization</a:t>
+                      </a:r>
+                      <a:endParaRPr lang="en-US" b="0"/>
+                    </a:p>
+                  </a:txBody>
+                  <a:tcPr/>
+                </a:tc>
+                <a:tc>
+                  <a:txBody>
+                    <a:bodyPr/>
+                    <a:lstStyle/>
+                    <a:p>
+                      <a:pPr marL="0" marR="0" lvl="0" indent="0" algn="l" defTabSz="914400" rtl="0" eaLnBrk="1" fontAlgn="auto" latinLnBrk="0" hangingPunct="1">
+                        <a:lnSpc>
+                          <a:spcPct val="100000"/>
+                        </a:lnSpc>
+                        <a:spcBef>
+                          <a:spcPts val="0"/>
+                        </a:spcBef>
+                        <a:spcAft>
+                          <a:spcPts val="0"/>
+                        </a:spcAft>
+                        <a:buClrTx/>
+                        <a:buSzTx/>
+                        <a:buFontTx/>
+                        <a:buNone/>
+                        <a:tabLst/>
+                        <a:defRPr/>
+                      </a:pPr>
+                      <a:r>
+                        <a:rPr lang="en-US" sz="1800"/>
+                        <a:t>Smart Contract (created DAO LLC)</a:t>
+                      </a:r>
+                      <a:endParaRPr lang="en-US"/>
+                    </a:p>
+                    <a:p>
+                      <a:pPr marL="0" marR="0" lvl="0" indent="0" algn="l" defTabSz="914400" rtl="0" eaLnBrk="1" fontAlgn="auto" latinLnBrk="0" hangingPunct="1">
+                        <a:lnSpc>
+                          <a:spcPct val="100000"/>
+                        </a:lnSpc>
+                        <a:spcBef>
+                          <a:spcPts val="0"/>
+                        </a:spcBef>
+                        <a:spcAft>
+                          <a:spcPts val="0"/>
+                        </a:spcAft>
+                        <a:buClrTx/>
+                        <a:buSzTx/>
+                        <a:buFontTx/>
+                        <a:buNone/>
+                        <a:tabLst/>
+                        <a:defRPr/>
+                      </a:pPr>
+                      <a:endParaRPr lang="en-US" b="0"/>
+                    </a:p>
+                  </a:txBody>
+                  <a:tcPr/>
+                </a:tc>
+                <a:extLst>
+                  <a:ext uri="{0D108BD9-81ED-4DB2-BD59-A6C34878D82A}">
+                    <a16:rowId xmlns:a16="http://schemas.microsoft.com/office/drawing/2014/main" val="3604245910"/>
+                  </a:ext>
+                </a:extLst>
+              </a:tr>
+              <a:tr h="370840">
+                <a:tc>
+                  <a:txBody>
+                    <a:bodyPr/>
+                    <a:lstStyle/>
+                    <a:p>
+                      <a:pPr marL="0" marR="0" lvl="0" indent="0" algn="l" defTabSz="914400" rtl="0" eaLnBrk="1" fontAlgn="auto" latinLnBrk="0" hangingPunct="1">
+                        <a:lnSpc>
+                          <a:spcPct val="100000"/>
+                        </a:lnSpc>
+                        <a:spcBef>
+                          <a:spcPts val="0"/>
+                        </a:spcBef>
+                        <a:spcAft>
+                          <a:spcPts val="0"/>
+                        </a:spcAft>
+                        <a:buClrTx/>
+                        <a:buSzTx/>
+                        <a:buFontTx/>
+                        <a:buNone/>
+                        <a:tabLst/>
+                        <a:defRPr/>
+                      </a:pPr>
+                      <a:r>
+                        <a:rPr lang="en-US" sz="1800"/>
+                        <a:t>Transaction is immutable to prevent fraud</a:t>
+                      </a:r>
+                      <a:endParaRPr lang="en-US" b="0"/>
+                    </a:p>
+                  </a:txBody>
+                  <a:tcPr/>
+                </a:tc>
+                <a:tc>
+                  <a:txBody>
+                    <a:bodyPr/>
+                    <a:lstStyle/>
+                    <a:p>
+                      <a:r>
+                        <a:rPr lang="en-US" b="0"/>
+                        <a:t>Blockchain</a:t>
+                      </a:r>
+                    </a:p>
+                  </a:txBody>
+                  <a:tcPr/>
+                </a:tc>
+                <a:extLst>
+                  <a:ext uri="{0D108BD9-81ED-4DB2-BD59-A6C34878D82A}">
+                    <a16:rowId xmlns:a16="http://schemas.microsoft.com/office/drawing/2014/main" val="1714030845"/>
+                  </a:ext>
+                </a:extLst>
+              </a:tr>
+              <a:tr h="370840">
+                <a:tc>
+                  <a:txBody>
+                    <a:bodyPr/>
+                    <a:lstStyle/>
+                    <a:p>
+                      <a:pPr marL="0" marR="0" lvl="0" indent="0" algn="l" defTabSz="914400" rtl="0" eaLnBrk="1" fontAlgn="auto" latinLnBrk="0" hangingPunct="1">
+                        <a:lnSpc>
+                          <a:spcPct val="100000"/>
+                        </a:lnSpc>
+                        <a:spcBef>
+                          <a:spcPts val="0"/>
+                        </a:spcBef>
+                        <a:spcAft>
+                          <a:spcPts val="0"/>
+                        </a:spcAft>
+                        <a:buClrTx/>
+                        <a:buSzTx/>
+                        <a:buFontTx/>
+                        <a:buNone/>
+                        <a:tabLst/>
+                        <a:defRPr/>
+                      </a:pPr>
+                      <a:r>
+                        <a:rPr lang="en-US" b="0"/>
+                        <a:t>House Voting System</a:t>
+                      </a:r>
+                    </a:p>
+                  </a:txBody>
+                  <a:tcPr/>
+                </a:tc>
+                <a:tc>
+                  <a:txBody>
+                    <a:bodyPr/>
+                    <a:lstStyle/>
+                    <a:p>
+                      <a:r>
+                        <a:rPr lang="en-US" b="0"/>
+                        <a:t>Blockchain</a:t>
+                      </a:r>
+                    </a:p>
+                  </a:txBody>
+                  <a:tcPr/>
+                </a:tc>
+                <a:extLst>
+                  <a:ext uri="{0D108BD9-81ED-4DB2-BD59-A6C34878D82A}">
+                    <a16:rowId xmlns:a16="http://schemas.microsoft.com/office/drawing/2014/main" val="640743273"/>
+                  </a:ext>
+                </a:extLst>
+              </a:tr>
+              <a:tr h="370840">
+                <a:tc>
+                  <a:txBody>
+                    <a:bodyPr/>
+                    <a:lstStyle/>
+                    <a:p>
+                      <a:r>
+                        <a:rPr lang="en-US" sz="1800"/>
+                        <a:t>NO MORE PAPERWORK</a:t>
+                      </a:r>
+                      <a:endParaRPr lang="en-US" b="0"/>
+                    </a:p>
+                  </a:txBody>
+                  <a:tcPr/>
+                </a:tc>
+                <a:tc>
+                  <a:txBody>
+                    <a:bodyPr/>
+                    <a:lstStyle/>
+                    <a:p>
+                      <a:r>
+                        <a:rPr lang="en-US" sz="1800"/>
+                        <a:t>Smart Contract</a:t>
+                      </a:r>
+                      <a:endParaRPr lang="en-US"/>
+                    </a:p>
+                  </a:txBody>
+                  <a:tcPr/>
+                </a:tc>
+                <a:extLst>
+                  <a:ext uri="{0D108BD9-81ED-4DB2-BD59-A6C34878D82A}">
+                    <a16:rowId xmlns:a16="http://schemas.microsoft.com/office/drawing/2014/main" val="594060864"/>
+                  </a:ext>
+                </a:extLst>
+              </a:tr>
+              <a:tr h="370840">
+                <a:tc>
+                  <a:txBody>
+                    <a:bodyPr/>
+                    <a:lstStyle/>
+                    <a:p>
+                      <a:r>
+                        <a:rPr lang="en-US" b="0"/>
+                        <a:t>Daily Income based on property type</a:t>
+                      </a:r>
+                    </a:p>
+                  </a:txBody>
+                  <a:tcPr/>
+                </a:tc>
+                <a:tc>
+                  <a:txBody>
+                    <a:bodyPr/>
+                    <a:lstStyle/>
+                    <a:p>
+                      <a:pPr marL="0" marR="0" lvl="0" indent="0" algn="l" defTabSz="914400" rtl="0" eaLnBrk="1" fontAlgn="auto" latinLnBrk="0" hangingPunct="1">
+                        <a:lnSpc>
+                          <a:spcPct val="100000"/>
+                        </a:lnSpc>
+                        <a:spcBef>
+                          <a:spcPts val="0"/>
+                        </a:spcBef>
+                        <a:spcAft>
+                          <a:spcPts val="0"/>
+                        </a:spcAft>
+                        <a:buClrTx/>
+                        <a:buSzTx/>
+                        <a:buFontTx/>
+                        <a:buNone/>
+                        <a:tabLst/>
+                        <a:defRPr/>
+                      </a:pPr>
+                      <a:r>
+                        <a:rPr lang="en-US"/>
+                        <a:t>Smart Contract (</a:t>
+                      </a:r>
+                      <a:r>
+                        <a:rPr lang="en-US" sz="1800" b="0" i="0" kern="1200">
+                          <a:solidFill>
+                            <a:schemeClr val="tx1"/>
+                          </a:solidFill>
+                          <a:effectLst/>
+                          <a:latin typeface="+mn-lt"/>
+                          <a:ea typeface="+mn-ea"/>
+                          <a:cs typeface="+mn-cs"/>
+                        </a:rPr>
+                        <a:t>residential, commercial/industrial)</a:t>
+                      </a:r>
+                    </a:p>
+                  </a:txBody>
+                  <a:tcPr/>
+                </a:tc>
+                <a:extLst>
+                  <a:ext uri="{0D108BD9-81ED-4DB2-BD59-A6C34878D82A}">
+                    <a16:rowId xmlns:a16="http://schemas.microsoft.com/office/drawing/2014/main" val="3530438629"/>
+                  </a:ext>
+                </a:extLst>
+              </a:tr>
+              <a:tr h="227123">
+                <a:tc>
+                  <a:txBody>
+                    <a:bodyPr/>
+                    <a:lstStyle/>
+                    <a:p>
+                      <a:pPr marL="0" marR="0" lvl="0" indent="0" algn="l" defTabSz="914400" rtl="0" eaLnBrk="1" fontAlgn="auto" latinLnBrk="0" hangingPunct="1">
+                        <a:lnSpc>
+                          <a:spcPct val="100000"/>
+                        </a:lnSpc>
+                        <a:spcBef>
+                          <a:spcPts val="0"/>
+                        </a:spcBef>
+                        <a:spcAft>
+                          <a:spcPts val="0"/>
+                        </a:spcAft>
+                        <a:buClrTx/>
+                        <a:buSzTx/>
+                        <a:buFontTx/>
+                        <a:buNone/>
+                        <a:tabLst/>
+                        <a:defRPr/>
+                      </a:pPr>
+                      <a:r>
+                        <a:rPr lang="en-US" sz="1800"/>
+                        <a:t>All house related documents is public on website so it’s total transparency</a:t>
+                      </a:r>
+                    </a:p>
+                  </a:txBody>
+                  <a:tcPr/>
+                </a:tc>
+                <a:tc>
+                  <a:txBody>
+                    <a:bodyPr/>
+                    <a:lstStyle/>
+                    <a:p>
+                      <a:endParaRPr lang="en-US"/>
+                    </a:p>
+                  </a:txBody>
+                  <a:tcPr/>
+                </a:tc>
+                <a:extLst>
+                  <a:ext uri="{0D108BD9-81ED-4DB2-BD59-A6C34878D82A}">
+                    <a16:rowId xmlns:a16="http://schemas.microsoft.com/office/drawing/2014/main" val="1263895782"/>
+                  </a:ext>
+                </a:extLst>
+              </a:tr>
+            </a:tbl>
+          </a:graphicData>
+        </a:graphic>
+      </p:graphicFrame>
     </p:spTree>
     <p:extLst>
       <p:ext uri="{BB962C8B-B14F-4D97-AF65-F5344CB8AC3E}">
-        <p14:creationId xmlns:p14="http://schemas.microsoft.com/office/powerpoint/2010/main" val="820926712"/>
+        <p14:creationId xmlns:p14="http://schemas.microsoft.com/office/powerpoint/2010/main" val="2510697136"/>
       </p:ext>
     </p:extLst>
   </p:cSld>
@@ -6054,10 +7528,10 @@
       </p:grpSpPr>
       <p:cxnSp>
         <p:nvCxnSpPr>
-          <p:cNvPr id="6" name="Straight Connector 5">
-            <a:extLst>
-              <a:ext uri="{FF2B5EF4-FFF2-40B4-BE49-F238E27FC236}">
-                <a16:creationId xmlns:a16="http://schemas.microsoft.com/office/drawing/2014/main" id="{A4BAE138-F457-4F1B-82F2-E96AD7B7D9B7}"/>
+          <p:cNvPr id="7" name="Straight Connector 6">
+            <a:extLst>
+              <a:ext uri="{FF2B5EF4-FFF2-40B4-BE49-F238E27FC236}">
+                <a16:creationId xmlns:a16="http://schemas.microsoft.com/office/drawing/2014/main" id="{387EA439-63F0-4B5C-9F69-4C78AC894323}"/>
               </a:ext>
             </a:extLst>
           </p:cNvPr>
@@ -6068,7 +7542,7 @@
         </p:nvCxnSpPr>
         <p:spPr>
           <a:xfrm>
-            <a:off x="357337" y="759607"/>
+            <a:off x="403635" y="736458"/>
             <a:ext cx="1092200" cy="0"/>
           </a:xfrm>
           <a:prstGeom prst="line">
@@ -6097,10 +7571,10 @@
       </p:cxnSp>
       <p:sp>
         <p:nvSpPr>
-          <p:cNvPr id="7" name="TextBox 6">
-            <a:extLst>
-              <a:ext uri="{FF2B5EF4-FFF2-40B4-BE49-F238E27FC236}">
-                <a16:creationId xmlns:a16="http://schemas.microsoft.com/office/drawing/2014/main" id="{B31E11F0-7240-4000-8CD9-CA32B8AA3B71}"/>
+          <p:cNvPr id="8" name="TextBox 7">
+            <a:extLst>
+              <a:ext uri="{FF2B5EF4-FFF2-40B4-BE49-F238E27FC236}">
+                <a16:creationId xmlns:a16="http://schemas.microsoft.com/office/drawing/2014/main" id="{7605B279-0E6E-4167-823B-CB75E27450E4}"/>
               </a:ext>
             </a:extLst>
           </p:cNvPr>
@@ -6109,7 +7583,360 @@
         </p:nvSpPr>
         <p:spPr>
           <a:xfrm>
-            <a:off x="276314" y="267165"/>
+            <a:off x="346432" y="244015"/>
+            <a:ext cx="8148320" cy="523220"/>
+          </a:xfrm>
+          <a:prstGeom prst="rect">
+            <a:avLst/>
+          </a:prstGeom>
+          <a:noFill/>
+        </p:spPr>
+        <p:txBody>
+          <a:bodyPr wrap="square" rtlCol="0">
+            <a:spAutoFit/>
+          </a:bodyPr>
+          <a:lstStyle/>
+          <a:p>
+            <a:r>
+              <a:rPr lang="en-US" sz="2800">
+                <a:latin typeface="Times New Roman" panose="02020603050405020304" pitchFamily="18" charset="0"/>
+                <a:cs typeface="Times New Roman" panose="02020603050405020304" pitchFamily="18" charset="0"/>
+              </a:rPr>
+              <a:t>Lease transaction using Blockchain</a:t>
+            </a:r>
+          </a:p>
+        </p:txBody>
+      </p:sp>
+      <p:pic>
+        <p:nvPicPr>
+          <p:cNvPr id="6" name="Picture 5">
+            <a:extLst>
+              <a:ext uri="{FF2B5EF4-FFF2-40B4-BE49-F238E27FC236}">
+                <a16:creationId xmlns:a16="http://schemas.microsoft.com/office/drawing/2014/main" id="{40BCA17E-FB61-4352-9D18-E2FB4F3B84FC}"/>
+              </a:ext>
+            </a:extLst>
+          </p:cNvPr>
+          <p:cNvPicPr>
+            <a:picLocks noChangeAspect="1"/>
+          </p:cNvPicPr>
+          <p:nvPr/>
+        </p:nvPicPr>
+        <p:blipFill>
+          <a:blip r:embed="rId3"/>
+          <a:stretch>
+            <a:fillRect/>
+          </a:stretch>
+        </p:blipFill>
+        <p:spPr>
+          <a:xfrm>
+            <a:off x="6501189" y="505625"/>
+            <a:ext cx="5504199" cy="6355539"/>
+          </a:xfrm>
+          <a:prstGeom prst="rect">
+            <a:avLst/>
+          </a:prstGeom>
+        </p:spPr>
+      </p:pic>
+      <p:sp>
+        <p:nvSpPr>
+          <p:cNvPr id="4" name="Rectangle 1">
+            <a:extLst>
+              <a:ext uri="{FF2B5EF4-FFF2-40B4-BE49-F238E27FC236}">
+                <a16:creationId xmlns:a16="http://schemas.microsoft.com/office/drawing/2014/main" id="{D9C69C54-C0AA-484F-A314-5FBA0B723757}"/>
+              </a:ext>
+            </a:extLst>
+          </p:cNvPr>
+          <p:cNvSpPr>
+            <a:spLocks noChangeArrowheads="1"/>
+          </p:cNvSpPr>
+          <p:nvPr/>
+        </p:nvSpPr>
+        <p:spPr bwMode="auto">
+          <a:xfrm>
+            <a:off x="472751" y="1672671"/>
+            <a:ext cx="12192000" cy="0"/>
+          </a:xfrm>
+          <a:prstGeom prst="rect">
+            <a:avLst/>
+          </a:prstGeom>
+          <a:noFill/>
+          <a:ln>
+            <a:noFill/>
+          </a:ln>
+          <a:effectLst/>
+          <a:extLst>
+            <a:ext uri="{909E8E84-426E-40DD-AFC4-6F175D3DCCD1}">
+              <a14:hiddenFill xmlns:a14="http://schemas.microsoft.com/office/drawing/2010/main">
+                <a:solidFill>
+                  <a:schemeClr val="accent1"/>
+                </a:solidFill>
+              </a14:hiddenFill>
+            </a:ext>
+            <a:ext uri="{91240B29-F687-4F45-9708-019B960494DF}">
+              <a14:hiddenLine xmlns:a14="http://schemas.microsoft.com/office/drawing/2010/main" w="9525">
+                <a:solidFill>
+                  <a:schemeClr val="tx1"/>
+                </a:solidFill>
+                <a:miter lim="800000"/>
+                <a:headEnd/>
+                <a:tailEnd/>
+              </a14:hiddenLine>
+            </a:ext>
+            <a:ext uri="{AF507438-7753-43E0-B8FC-AC1667EBCBE1}">
+              <a14:hiddenEffects xmlns:a14="http://schemas.microsoft.com/office/drawing/2010/main">
+                <a:effectLst>
+                  <a:outerShdw dist="35921" dir="2700000" algn="ctr" rotWithShape="0">
+                    <a:schemeClr val="bg2"/>
+                  </a:outerShdw>
+                </a:effectLst>
+              </a14:hiddenEffects>
+            </a:ext>
+          </a:extLst>
+        </p:spPr>
+        <p:txBody>
+          <a:bodyPr vert="horz" wrap="none" lIns="91440" tIns="45720" rIns="91440" bIns="45720" numCol="1" anchor="ctr" anchorCtr="0" compatLnSpc="1">
+            <a:prstTxWarp prst="textNoShape">
+              <a:avLst/>
+            </a:prstTxWarp>
+            <a:spAutoFit/>
+          </a:bodyPr>
+          <a:lstStyle/>
+          <a:p>
+            <a:pPr marL="0" marR="0" lvl="0" indent="0" algn="l" defTabSz="914400" rtl="0" eaLnBrk="0" fontAlgn="base" latinLnBrk="0" hangingPunct="0">
+              <a:lnSpc>
+                <a:spcPct val="100000"/>
+              </a:lnSpc>
+              <a:spcBef>
+                <a:spcPct val="0"/>
+              </a:spcBef>
+              <a:spcAft>
+                <a:spcPct val="0"/>
+              </a:spcAft>
+              <a:buClrTx/>
+              <a:buSzTx/>
+              <a:buFontTx/>
+              <a:buNone/>
+              <a:tabLst/>
+            </a:pPr>
+            <a:br>
+              <a:rPr kumimoji="0" lang="en-US" altLang="en-US" sz="1800" b="0" i="0" u="none" strike="noStrike" cap="none" normalizeH="0" baseline="0">
+                <a:ln>
+                  <a:noFill/>
+                </a:ln>
+                <a:solidFill>
+                  <a:schemeClr val="tx1"/>
+                </a:solidFill>
+                <a:effectLst/>
+                <a:latin typeface="Arial" panose="020B0604020202020204" pitchFamily="34" charset="0"/>
+              </a:rPr>
+            </a:br>
+            <a:endParaRPr kumimoji="0" lang="en-US" altLang="en-US" sz="1800" b="0" i="0" u="none" strike="noStrike" cap="none" normalizeH="0" baseline="0">
+              <a:ln>
+                <a:noFill/>
+              </a:ln>
+              <a:solidFill>
+                <a:schemeClr val="tx1"/>
+              </a:solidFill>
+              <a:effectLst/>
+              <a:latin typeface="Arial" panose="020B0604020202020204" pitchFamily="34" charset="0"/>
+            </a:endParaRPr>
+          </a:p>
+        </p:txBody>
+      </p:sp>
+      <p:sp>
+        <p:nvSpPr>
+          <p:cNvPr id="11" name="TextBox 10">
+            <a:extLst>
+              <a:ext uri="{FF2B5EF4-FFF2-40B4-BE49-F238E27FC236}">
+                <a16:creationId xmlns:a16="http://schemas.microsoft.com/office/drawing/2014/main" id="{A0BF8CF2-84A9-41AD-9E23-387D4B2FDD5E}"/>
+              </a:ext>
+            </a:extLst>
+          </p:cNvPr>
+          <p:cNvSpPr txBox="1"/>
+          <p:nvPr/>
+        </p:nvSpPr>
+        <p:spPr>
+          <a:xfrm>
+            <a:off x="403635" y="859569"/>
+            <a:ext cx="6097554" cy="2031325"/>
+          </a:xfrm>
+          <a:prstGeom prst="rect">
+            <a:avLst/>
+          </a:prstGeom>
+          <a:noFill/>
+        </p:spPr>
+        <p:txBody>
+          <a:bodyPr wrap="square">
+            <a:spAutoFit/>
+          </a:bodyPr>
+          <a:lstStyle/>
+          <a:p>
+            <a:pPr marL="342900" indent="-342900">
+              <a:buFont typeface="Arial" panose="020B0604020202020204" pitchFamily="34" charset="0"/>
+              <a:buChar char="•"/>
+            </a:pPr>
+            <a:r>
+              <a:rPr lang="en-US" sz="1800">
+                <a:solidFill>
+                  <a:srgbClr val="00B050"/>
+                </a:solidFill>
+              </a:rPr>
+              <a:t>1</a:t>
+            </a:r>
+            <a:r>
+              <a:rPr lang="en-US" sz="1800"/>
+              <a:t>: A transparent MLS system enables all parties to view the available listings and documents based on their requirements.</a:t>
+            </a:r>
+          </a:p>
+          <a:p>
+            <a:pPr marL="342900" indent="-342900">
+              <a:buFont typeface="Arial" panose="020B0604020202020204" pitchFamily="34" charset="0"/>
+              <a:buChar char="•"/>
+            </a:pPr>
+            <a:r>
+              <a:rPr lang="en-US">
+                <a:solidFill>
+                  <a:srgbClr val="00B050"/>
+                </a:solidFill>
+              </a:rPr>
+              <a:t>4</a:t>
+            </a:r>
+            <a:r>
+              <a:rPr lang="en-US" sz="1800"/>
+              <a:t>: All property/buyer/seller will be verified before joining marketplace</a:t>
+            </a:r>
+          </a:p>
+          <a:p>
+            <a:pPr marL="342900" indent="-342900">
+              <a:buFont typeface="Arial" panose="020B0604020202020204" pitchFamily="34" charset="0"/>
+              <a:buChar char="•"/>
+            </a:pPr>
+            <a:r>
+              <a:rPr lang="en-US" sz="1800">
+                <a:solidFill>
+                  <a:srgbClr val="00B050"/>
+                </a:solidFill>
+              </a:rPr>
+              <a:t>6</a:t>
+            </a:r>
+            <a:r>
+              <a:rPr lang="en-US" sz="1800"/>
+              <a:t>: Lease agreement uses House Tokenization and NFT</a:t>
+            </a:r>
+          </a:p>
+          <a:p>
+            <a:pPr marL="342900" indent="-342900">
+              <a:buFont typeface="Arial" panose="020B0604020202020204" pitchFamily="34" charset="0"/>
+              <a:buChar char="•"/>
+            </a:pPr>
+            <a:r>
+              <a:rPr lang="en-US" sz="1800">
+                <a:solidFill>
+                  <a:srgbClr val="00B050"/>
+                </a:solidFill>
+              </a:rPr>
+              <a:t>7: </a:t>
+            </a:r>
+            <a:r>
+              <a:rPr lang="en-US" sz="1800"/>
+              <a:t>Investor will earn income daily based on their own token</a:t>
+            </a:r>
+            <a:endParaRPr lang="en-US" sz="1800">
+              <a:solidFill>
+                <a:srgbClr val="00B050"/>
+              </a:solidFill>
+            </a:endParaRPr>
+          </a:p>
+        </p:txBody>
+      </p:sp>
+    </p:spTree>
+    <p:extLst>
+      <p:ext uri="{BB962C8B-B14F-4D97-AF65-F5344CB8AC3E}">
+        <p14:creationId xmlns:p14="http://schemas.microsoft.com/office/powerpoint/2010/main" val="3155695403"/>
+      </p:ext>
+    </p:extLst>
+  </p:cSld>
+  <p:clrMapOvr>
+    <a:masterClrMapping/>
+  </p:clrMapOvr>
+</p:sld>
+</file>
+
+<file path=ppt/slides/slide9.xml><?xml version="1.0" encoding="utf-8"?>
+<p:sld xmlns:a="http://schemas.openxmlformats.org/drawingml/2006/main" xmlns:r="http://schemas.openxmlformats.org/officeDocument/2006/relationships" xmlns:p="http://schemas.openxmlformats.org/presentationml/2006/main">
+  <p:cSld>
+    <p:spTree>
+      <p:nvGrpSpPr>
+        <p:cNvPr id="1" name=""/>
+        <p:cNvGrpSpPr/>
+        <p:nvPr/>
+      </p:nvGrpSpPr>
+      <p:grpSpPr>
+        <a:xfrm>
+          <a:off x="0" y="0"/>
+          <a:ext cx="0" cy="0"/>
+          <a:chOff x="0" y="0"/>
+          <a:chExt cx="0" cy="0"/>
+        </a:xfrm>
+      </p:grpSpPr>
+      <p:cxnSp>
+        <p:nvCxnSpPr>
+          <p:cNvPr id="4" name="Straight Connector 3">
+            <a:extLst>
+              <a:ext uri="{FF2B5EF4-FFF2-40B4-BE49-F238E27FC236}">
+                <a16:creationId xmlns:a16="http://schemas.microsoft.com/office/drawing/2014/main" id="{FD8945C5-D086-40AE-855A-DE1E0C847B8B}"/>
+              </a:ext>
+            </a:extLst>
+          </p:cNvPr>
+          <p:cNvCxnSpPr>
+            <a:cxnSpLocks/>
+          </p:cNvCxnSpPr>
+          <p:nvPr/>
+        </p:nvCxnSpPr>
+        <p:spPr>
+          <a:xfrm>
+            <a:off x="403635" y="736458"/>
+            <a:ext cx="1092200" cy="0"/>
+          </a:xfrm>
+          <a:prstGeom prst="line">
+            <a:avLst/>
+          </a:prstGeom>
+          <a:ln w="57150">
+            <a:solidFill>
+              <a:srgbClr val="C00000"/>
+            </a:solidFill>
+          </a:ln>
+        </p:spPr>
+        <p:style>
+          <a:lnRef idx="1">
+            <a:schemeClr val="accent1"/>
+          </a:lnRef>
+          <a:fillRef idx="0">
+            <a:schemeClr val="accent1"/>
+          </a:fillRef>
+          <a:effectRef idx="0">
+            <a:schemeClr val="accent1"/>
+          </a:effectRef>
+          <a:fontRef idx="minor">
+            <a:schemeClr val="tx1"/>
+          </a:fontRef>
+        </p:style>
+      </p:cxnSp>
+      <p:sp>
+        <p:nvSpPr>
+          <p:cNvPr id="5" name="TextBox 4">
+            <a:extLst>
+              <a:ext uri="{FF2B5EF4-FFF2-40B4-BE49-F238E27FC236}">
+                <a16:creationId xmlns:a16="http://schemas.microsoft.com/office/drawing/2014/main" id="{48F65BD5-DBA0-40D9-8CC7-2E2E5678ECE2}"/>
+              </a:ext>
+            </a:extLst>
+          </p:cNvPr>
+          <p:cNvSpPr txBox="1"/>
+          <p:nvPr/>
+        </p:nvSpPr>
+        <p:spPr>
+          <a:xfrm>
+            <a:off x="322612" y="244016"/>
             <a:ext cx="8148320" cy="492443"/>
           </a:xfrm>
           <a:prstGeom prst="rect">
@@ -6124,25 +7951,51 @@
           <a:lstStyle/>
           <a:p>
             <a:r>
-              <a:rPr lang="en-US" sz="2600">
+              <a:rPr lang="en-US" sz="2600" dirty="0">
                 <a:latin typeface="Times New Roman" panose="02020603050405020304" pitchFamily="18" charset="0"/>
                 <a:cs typeface="Times New Roman" panose="02020603050405020304" pitchFamily="18" charset="0"/>
               </a:rPr>
-              <a:t>Want to know more ?</a:t>
-            </a:r>
-            <a:endParaRPr lang="en-US" sz="2600" dirty="0">
-              <a:latin typeface="Times New Roman" panose="02020603050405020304" pitchFamily="18" charset="0"/>
-              <a:cs typeface="Times New Roman" panose="02020603050405020304" pitchFamily="18" charset="0"/>
-            </a:endParaRPr>
-          </a:p>
-        </p:txBody>
-      </p:sp>
+              <a:t>House tokenization</a:t>
+            </a:r>
+          </a:p>
+        </p:txBody>
+      </p:sp>
+      <p:pic>
+        <p:nvPicPr>
+          <p:cNvPr id="7" name="Picture 6">
+            <a:extLst>
+              <a:ext uri="{FF2B5EF4-FFF2-40B4-BE49-F238E27FC236}">
+                <a16:creationId xmlns:a16="http://schemas.microsoft.com/office/drawing/2014/main" id="{EB46A7EC-540A-4709-89DC-62F46F440CF2}"/>
+              </a:ext>
+            </a:extLst>
+          </p:cNvPr>
+          <p:cNvPicPr>
+            <a:picLocks noChangeAspect="1"/>
+          </p:cNvPicPr>
+          <p:nvPr/>
+        </p:nvPicPr>
+        <p:blipFill>
+          <a:blip r:embed="rId2"/>
+          <a:stretch>
+            <a:fillRect/>
+          </a:stretch>
+        </p:blipFill>
+        <p:spPr>
+          <a:xfrm>
+            <a:off x="322611" y="2523264"/>
+            <a:ext cx="11409750" cy="4090720"/>
+          </a:xfrm>
+          <a:prstGeom prst="rect">
+            <a:avLst/>
+          </a:prstGeom>
+        </p:spPr>
+      </p:pic>
       <p:sp>
         <p:nvSpPr>
           <p:cNvPr id="8" name="TextBox 7">
             <a:extLst>
               <a:ext uri="{FF2B5EF4-FFF2-40B4-BE49-F238E27FC236}">
-                <a16:creationId xmlns:a16="http://schemas.microsoft.com/office/drawing/2014/main" id="{DE6DBDFD-2A32-4353-AD6D-A2E6C950EDA5}"/>
+                <a16:creationId xmlns:a16="http://schemas.microsoft.com/office/drawing/2014/main" id="{57819BF9-8FC3-4825-BC66-2BCCD99DBD00}"/>
               </a:ext>
             </a:extLst>
           </p:cNvPr>
@@ -6151,8 +8004,8 @@
         </p:nvSpPr>
         <p:spPr>
           <a:xfrm>
-            <a:off x="357337" y="924560"/>
-            <a:ext cx="6563360" cy="1477328"/>
+            <a:off x="322611" y="850297"/>
+            <a:ext cx="9409217" cy="1323439"/>
           </a:xfrm>
           <a:prstGeom prst="rect">
             <a:avLst/>
@@ -6165,130 +8018,64 @@
           </a:bodyPr>
           <a:lstStyle/>
           <a:p>
-            <a:r>
-              <a:rPr lang="en-US"/>
-              <a:t>Check our folder, it will contains</a:t>
-            </a:r>
-          </a:p>
-          <a:p>
-            <a:pPr marL="285750" indent="-285750">
+            <a:pPr marL="342900" indent="-342900">
               <a:buFont typeface="Arial" panose="020B0604020202020204" pitchFamily="34" charset="0"/>
               <a:buChar char="•"/>
             </a:pPr>
             <a:r>
-              <a:rPr lang="en-US"/>
-              <a:t>Lofty_introduction_platform: a introduction to Lofty platform for you to know more. Because our system is based on it</a:t>
-            </a:r>
-          </a:p>
-          <a:p>
-            <a:pPr marL="285750" indent="-285750">
+              <a:rPr lang="en-US" sz="2000" dirty="0">
+                <a:latin typeface="Times New Roman" panose="02020603050405020304" pitchFamily="18" charset="0"/>
+                <a:cs typeface="Times New Roman" panose="02020603050405020304" pitchFamily="18" charset="0"/>
+              </a:rPr>
+              <a:t>A method that can enable investors to </a:t>
+            </a:r>
+            <a:r>
+              <a:rPr lang="en-US" sz="2000" b="1" dirty="0">
+                <a:latin typeface="Times New Roman" panose="02020603050405020304" pitchFamily="18" charset="0"/>
+                <a:cs typeface="Times New Roman" panose="02020603050405020304" pitchFamily="18" charset="0"/>
+              </a:rPr>
+              <a:t>own fractional ownership in a property</a:t>
+            </a:r>
+          </a:p>
+          <a:p>
+            <a:pPr marL="342900" indent="-342900">
               <a:buFont typeface="Arial" panose="020B0604020202020204" pitchFamily="34" charset="0"/>
               <a:buChar char="•"/>
             </a:pPr>
             <a:r>
-              <a:rPr lang="en-US"/>
-              <a:t>real_estate_poc_erd: </a:t>
-            </a:r>
-            <a:r>
-              <a:rPr lang="en-US" b="1"/>
-              <a:t>A proof of concept</a:t>
-            </a:r>
-            <a:r>
-              <a:rPr lang="en-US"/>
-              <a:t> of system’s ERD. Our system will store all transaction tables in Hyperledger Fabric</a:t>
-            </a:r>
-          </a:p>
-        </p:txBody>
-      </p:sp>
-      <p:pic>
-        <p:nvPicPr>
-          <p:cNvPr id="3074" name="Picture 2" descr="Human Resources / Informational Links for All">
-            <a:extLst>
-              <a:ext uri="{FF2B5EF4-FFF2-40B4-BE49-F238E27FC236}">
-                <a16:creationId xmlns:a16="http://schemas.microsoft.com/office/drawing/2014/main" id="{C20292E1-40C1-4620-94BA-982AC76193AD}"/>
-              </a:ext>
-            </a:extLst>
-          </p:cNvPr>
-          <p:cNvPicPr>
-            <a:picLocks noChangeAspect="1" noChangeArrowheads="1"/>
-          </p:cNvPicPr>
-          <p:nvPr/>
-        </p:nvPicPr>
-        <p:blipFill>
-          <a:blip r:embed="rId2">
-            <a:extLst>
-              <a:ext uri="{28A0092B-C50C-407E-A947-70E740481C1C}">
-                <a14:useLocalDpi xmlns:a14="http://schemas.microsoft.com/office/drawing/2010/main" val="0"/>
-              </a:ext>
-            </a:extLst>
-          </a:blip>
-          <a:srcRect/>
-          <a:stretch>
-            <a:fillRect/>
-          </a:stretch>
-        </p:blipFill>
-        <p:spPr bwMode="auto">
-          <a:xfrm>
-            <a:off x="520154" y="3068320"/>
-            <a:ext cx="5945431" cy="3692140"/>
-          </a:xfrm>
-          <a:prstGeom prst="rect">
-            <a:avLst/>
-          </a:prstGeom>
-          <a:noFill/>
-          <a:extLst>
-            <a:ext uri="{909E8E84-426E-40DD-AFC4-6F175D3DCCD1}">
-              <a14:hiddenFill xmlns:a14="http://schemas.microsoft.com/office/drawing/2010/main">
-                <a:solidFill>
-                  <a:srgbClr val="FFFFFF"/>
-                </a:solidFill>
-              </a14:hiddenFill>
-            </a:ext>
-          </a:extLst>
-        </p:spPr>
-      </p:pic>
-      <p:sp>
-        <p:nvSpPr>
-          <p:cNvPr id="9" name="TextBox 8">
-            <a:extLst>
-              <a:ext uri="{FF2B5EF4-FFF2-40B4-BE49-F238E27FC236}">
-                <a16:creationId xmlns:a16="http://schemas.microsoft.com/office/drawing/2014/main" id="{05489520-47BE-42CC-912C-C4BAD47EC87C}"/>
-              </a:ext>
-            </a:extLst>
-          </p:cNvPr>
-          <p:cNvSpPr txBox="1"/>
-          <p:nvPr/>
-        </p:nvSpPr>
-        <p:spPr>
-          <a:xfrm>
-            <a:off x="357337" y="2608036"/>
-            <a:ext cx="7764411" cy="369332"/>
-          </a:xfrm>
-          <a:prstGeom prst="rect">
-            <a:avLst/>
-          </a:prstGeom>
-          <a:noFill/>
-        </p:spPr>
-        <p:txBody>
-          <a:bodyPr wrap="square">
-            <a:spAutoFit/>
-          </a:bodyPr>
-          <a:lstStyle/>
-          <a:p>
-            <a:r>
-              <a:rPr lang="en-US">
-                <a:hlinkClick r:id="rId3"/>
+              <a:rPr lang="en-US" sz="2000" dirty="0">
+                <a:latin typeface="Times New Roman" panose="02020603050405020304" pitchFamily="18" charset="0"/>
+                <a:cs typeface="Times New Roman" panose="02020603050405020304" pitchFamily="18" charset="0"/>
               </a:rPr>
-              <a:t>VinhQuocTran/finalterm_real_estate_blockchain (github.com)</a:t>
-            </a:r>
-            <a:endParaRPr lang="en-US"/>
+              <a:t>The process of issuing tokens may take a form of the IPO applied in the stock market</a:t>
+            </a:r>
+          </a:p>
+          <a:p>
+            <a:pPr marL="342900" indent="-342900">
+              <a:buFont typeface="Arial" panose="020B0604020202020204" pitchFamily="34" charset="0"/>
+              <a:buChar char="•"/>
+            </a:pPr>
+            <a:r>
+              <a:rPr lang="en-US" sz="2000" dirty="0">
+                <a:latin typeface="Times New Roman" panose="02020603050405020304" pitchFamily="18" charset="0"/>
+                <a:cs typeface="Times New Roman" panose="02020603050405020304" pitchFamily="18" charset="0"/>
+              </a:rPr>
+              <a:t>The owner of the property may issue tokens based on the market value of the property and sell them to potential investors </a:t>
+            </a:r>
+            <a:r>
+              <a:rPr lang="en-US" sz="2000" b="1" dirty="0">
+                <a:latin typeface="Times New Roman" panose="02020603050405020304" pitchFamily="18" charset="0"/>
+                <a:cs typeface="Times New Roman" panose="02020603050405020304" pitchFamily="18" charset="0"/>
+              </a:rPr>
+              <a:t>just like shares in a company</a:t>
+            </a:r>
           </a:p>
         </p:txBody>
       </p:sp>
     </p:spTree>
     <p:extLst>
       <p:ext uri="{BB962C8B-B14F-4D97-AF65-F5344CB8AC3E}">
-        <p14:creationId xmlns:p14="http://schemas.microsoft.com/office/powerpoint/2010/main" val="1761510605"/>
+        <p14:creationId xmlns:p14="http://schemas.microsoft.com/office/powerpoint/2010/main" val="820926712"/>
       </p:ext>
     </p:extLst>
   </p:cSld>
@@ -6591,4 +8378,299 @@
     </a:ext>
   </a:extLst>
 </a:theme>
+</file>
+
+<file path=ppt/theme/theme2.xml><?xml version="1.0" encoding="utf-8"?>
+<a:theme xmlns:a="http://schemas.openxmlformats.org/drawingml/2006/main" name="Office Theme">
+  <a:themeElements>
+    <a:clrScheme name="Office">
+      <a:dk1>
+        <a:sysClr val="windowText" lastClr="000000"/>
+      </a:dk1>
+      <a:lt1>
+        <a:sysClr val="window" lastClr="FFFFFF"/>
+      </a:lt1>
+      <a:dk2>
+        <a:srgbClr val="44546A"/>
+      </a:dk2>
+      <a:lt2>
+        <a:srgbClr val="E7E6E6"/>
+      </a:lt2>
+      <a:accent1>
+        <a:srgbClr val="4472C4"/>
+      </a:accent1>
+      <a:accent2>
+        <a:srgbClr val="ED7D31"/>
+      </a:accent2>
+      <a:accent3>
+        <a:srgbClr val="A5A5A5"/>
+      </a:accent3>
+      <a:accent4>
+        <a:srgbClr val="FFC000"/>
+      </a:accent4>
+      <a:accent5>
+        <a:srgbClr val="5B9BD5"/>
+      </a:accent5>
+      <a:accent6>
+        <a:srgbClr val="70AD47"/>
+      </a:accent6>
+      <a:hlink>
+        <a:srgbClr val="0563C1"/>
+      </a:hlink>
+      <a:folHlink>
+        <a:srgbClr val="954F72"/>
+      </a:folHlink>
+    </a:clrScheme>
+    <a:fontScheme name="Office">
+      <a:majorFont>
+        <a:latin typeface="Calibri Light" panose="020F0302020204030204"/>
+        <a:ea typeface=""/>
+        <a:cs typeface=""/>
+        <a:font script="Jpan" typeface="游ゴシック Light"/>
+        <a:font script="Hang" typeface="맑은 고딕"/>
+        <a:font script="Hans" typeface="等线 Light"/>
+        <a:font script="Hant" typeface="新細明體"/>
+        <a:font script="Arab" typeface="Times New Roman"/>
+        <a:font script="Hebr" typeface="Times New Roman"/>
+        <a:font script="Thai" typeface="Angsana New"/>
+        <a:font script="Ethi" typeface="Nyala"/>
+        <a:font script="Beng" typeface="Vrinda"/>
+        <a:font script="Gujr" typeface="Shruti"/>
+        <a:font script="Khmr" typeface="MoolBoran"/>
+        <a:font script="Knda" typeface="Tunga"/>
+        <a:font script="Guru" typeface="Raavi"/>
+        <a:font script="Cans" typeface="Euphemia"/>
+        <a:font script="Cher" typeface="Plantagenet Cherokee"/>
+        <a:font script="Yiii" typeface="Microsoft Yi Baiti"/>
+        <a:font script="Tibt" typeface="Microsoft Himalaya"/>
+        <a:font script="Thaa" typeface="MV Boli"/>
+        <a:font script="Deva" typeface="Mangal"/>
+        <a:font script="Telu" typeface="Gautami"/>
+        <a:font script="Taml" typeface="Latha"/>
+        <a:font script="Syrc" typeface="Estrangelo Edessa"/>
+        <a:font script="Orya" typeface="Kalinga"/>
+        <a:font script="Mlym" typeface="Kartika"/>
+        <a:font script="Laoo" typeface="DokChampa"/>
+        <a:font script="Sinh" typeface="Iskoola Pota"/>
+        <a:font script="Mong" typeface="Mongolian Baiti"/>
+        <a:font script="Viet" typeface="Times New Roman"/>
+        <a:font script="Uigh" typeface="Microsoft Uighur"/>
+        <a:font script="Geor" typeface="Sylfaen"/>
+        <a:font script="Armn" typeface="Arial"/>
+        <a:font script="Bugi" typeface="Leelawadee UI"/>
+        <a:font script="Bopo" typeface="Microsoft JhengHei"/>
+        <a:font script="Java" typeface="Javanese Text"/>
+        <a:font script="Lisu" typeface="Segoe UI"/>
+        <a:font script="Mymr" typeface="Myanmar Text"/>
+        <a:font script="Nkoo" typeface="Ebrima"/>
+        <a:font script="Olck" typeface="Nirmala UI"/>
+        <a:font script="Osma" typeface="Ebrima"/>
+        <a:font script="Phag" typeface="Phagspa"/>
+        <a:font script="Syrn" typeface="Estrangelo Edessa"/>
+        <a:font script="Syrj" typeface="Estrangelo Edessa"/>
+        <a:font script="Syre" typeface="Estrangelo Edessa"/>
+        <a:font script="Sora" typeface="Nirmala UI"/>
+        <a:font script="Tale" typeface="Microsoft Tai Le"/>
+        <a:font script="Talu" typeface="Microsoft New Tai Lue"/>
+        <a:font script="Tfng" typeface="Ebrima"/>
+      </a:majorFont>
+      <a:minorFont>
+        <a:latin typeface="Calibri" panose="020F0502020204030204"/>
+        <a:ea typeface=""/>
+        <a:cs typeface=""/>
+        <a:font script="Jpan" typeface="游ゴシック"/>
+        <a:font script="Hang" typeface="맑은 고딕"/>
+        <a:font script="Hans" typeface="等线"/>
+        <a:font script="Hant" typeface="新細明體"/>
+        <a:font script="Arab" typeface="Arial"/>
+        <a:font script="Hebr" typeface="Arial"/>
+        <a:font script="Thai" typeface="Cordia New"/>
+        <a:font script="Ethi" typeface="Nyala"/>
+        <a:font script="Beng" typeface="Vrinda"/>
+        <a:font script="Gujr" typeface="Shruti"/>
+        <a:font script="Khmr" typeface="DaunPenh"/>
+        <a:font script="Knda" typeface="Tunga"/>
+        <a:font script="Guru" typeface="Raavi"/>
+        <a:font script="Cans" typeface="Euphemia"/>
+        <a:font script="Cher" typeface="Plantagenet Cherokee"/>
+        <a:font script="Yiii" typeface="Microsoft Yi Baiti"/>
+        <a:font script="Tibt" typeface="Microsoft Himalaya"/>
+        <a:font script="Thaa" typeface="MV Boli"/>
+        <a:font script="Deva" typeface="Mangal"/>
+        <a:font script="Telu" typeface="Gautami"/>
+        <a:font script="Taml" typeface="Latha"/>
+        <a:font script="Syrc" typeface="Estrangelo Edessa"/>
+        <a:font script="Orya" typeface="Kalinga"/>
+        <a:font script="Mlym" typeface="Kartika"/>
+        <a:font script="Laoo" typeface="DokChampa"/>
+        <a:font script="Sinh" typeface="Iskoola Pota"/>
+        <a:font script="Mong" typeface="Mongolian Baiti"/>
+        <a:font script="Viet" typeface="Arial"/>
+        <a:font script="Uigh" typeface="Microsoft Uighur"/>
+        <a:font script="Geor" typeface="Sylfaen"/>
+        <a:font script="Armn" typeface="Arial"/>
+        <a:font script="Bugi" typeface="Leelawadee UI"/>
+        <a:font script="Bopo" typeface="Microsoft JhengHei"/>
+        <a:font script="Java" typeface="Javanese Text"/>
+        <a:font script="Lisu" typeface="Segoe UI"/>
+        <a:font script="Mymr" typeface="Myanmar Text"/>
+        <a:font script="Nkoo" typeface="Ebrima"/>
+        <a:font script="Olck" typeface="Nirmala UI"/>
+        <a:font script="Osma" typeface="Ebrima"/>
+        <a:font script="Phag" typeface="Phagspa"/>
+        <a:font script="Syrn" typeface="Estrangelo Edessa"/>
+        <a:font script="Syrj" typeface="Estrangelo Edessa"/>
+        <a:font script="Syre" typeface="Estrangelo Edessa"/>
+        <a:font script="Sora" typeface="Nirmala UI"/>
+        <a:font script="Tale" typeface="Microsoft Tai Le"/>
+        <a:font script="Talu" typeface="Microsoft New Tai Lue"/>
+        <a:font script="Tfng" typeface="Ebrima"/>
+      </a:minorFont>
+    </a:fontScheme>
+    <a:fmtScheme name="Office">
+      <a:fillStyleLst>
+        <a:solidFill>
+          <a:schemeClr val="phClr"/>
+        </a:solidFill>
+        <a:gradFill rotWithShape="1">
+          <a:gsLst>
+            <a:gs pos="0">
+              <a:schemeClr val="phClr">
+                <a:lumMod val="110000"/>
+                <a:satMod val="105000"/>
+                <a:tint val="67000"/>
+              </a:schemeClr>
+            </a:gs>
+            <a:gs pos="50000">
+              <a:schemeClr val="phClr">
+                <a:lumMod val="105000"/>
+                <a:satMod val="103000"/>
+                <a:tint val="73000"/>
+              </a:schemeClr>
+            </a:gs>
+            <a:gs pos="100000">
+              <a:schemeClr val="phClr">
+                <a:lumMod val="105000"/>
+                <a:satMod val="109000"/>
+                <a:tint val="81000"/>
+              </a:schemeClr>
+            </a:gs>
+          </a:gsLst>
+          <a:lin ang="5400000" scaled="0"/>
+        </a:gradFill>
+        <a:gradFill rotWithShape="1">
+          <a:gsLst>
+            <a:gs pos="0">
+              <a:schemeClr val="phClr">
+                <a:satMod val="103000"/>
+                <a:lumMod val="102000"/>
+                <a:tint val="94000"/>
+              </a:schemeClr>
+            </a:gs>
+            <a:gs pos="50000">
+              <a:schemeClr val="phClr">
+                <a:satMod val="110000"/>
+                <a:lumMod val="100000"/>
+                <a:shade val="100000"/>
+              </a:schemeClr>
+            </a:gs>
+            <a:gs pos="100000">
+              <a:schemeClr val="phClr">
+                <a:lumMod val="99000"/>
+                <a:satMod val="120000"/>
+                <a:shade val="78000"/>
+              </a:schemeClr>
+            </a:gs>
+          </a:gsLst>
+          <a:lin ang="5400000" scaled="0"/>
+        </a:gradFill>
+      </a:fillStyleLst>
+      <a:lnStyleLst>
+        <a:ln w="6350" cap="flat" cmpd="sng" algn="ctr">
+          <a:solidFill>
+            <a:schemeClr val="phClr"/>
+          </a:solidFill>
+          <a:prstDash val="solid"/>
+          <a:miter lim="800000"/>
+        </a:ln>
+        <a:ln w="12700" cap="flat" cmpd="sng" algn="ctr">
+          <a:solidFill>
+            <a:schemeClr val="phClr"/>
+          </a:solidFill>
+          <a:prstDash val="solid"/>
+          <a:miter lim="800000"/>
+        </a:ln>
+        <a:ln w="19050" cap="flat" cmpd="sng" algn="ctr">
+          <a:solidFill>
+            <a:schemeClr val="phClr"/>
+          </a:solidFill>
+          <a:prstDash val="solid"/>
+          <a:miter lim="800000"/>
+        </a:ln>
+      </a:lnStyleLst>
+      <a:effectStyleLst>
+        <a:effectStyle>
+          <a:effectLst/>
+        </a:effectStyle>
+        <a:effectStyle>
+          <a:effectLst/>
+        </a:effectStyle>
+        <a:effectStyle>
+          <a:effectLst>
+            <a:outerShdw blurRad="57150" dist="19050" dir="5400000" algn="ctr" rotWithShape="0">
+              <a:srgbClr val="000000">
+                <a:alpha val="63000"/>
+              </a:srgbClr>
+            </a:outerShdw>
+          </a:effectLst>
+        </a:effectStyle>
+      </a:effectStyleLst>
+      <a:bgFillStyleLst>
+        <a:solidFill>
+          <a:schemeClr val="phClr"/>
+        </a:solidFill>
+        <a:solidFill>
+          <a:schemeClr val="phClr">
+            <a:tint val="95000"/>
+            <a:satMod val="170000"/>
+          </a:schemeClr>
+        </a:solidFill>
+        <a:gradFill rotWithShape="1">
+          <a:gsLst>
+            <a:gs pos="0">
+              <a:schemeClr val="phClr">
+                <a:tint val="93000"/>
+                <a:satMod val="150000"/>
+                <a:shade val="98000"/>
+                <a:lumMod val="102000"/>
+              </a:schemeClr>
+            </a:gs>
+            <a:gs pos="50000">
+              <a:schemeClr val="phClr">
+                <a:tint val="98000"/>
+                <a:satMod val="130000"/>
+                <a:shade val="90000"/>
+                <a:lumMod val="103000"/>
+              </a:schemeClr>
+            </a:gs>
+            <a:gs pos="100000">
+              <a:schemeClr val="phClr">
+                <a:shade val="63000"/>
+                <a:satMod val="120000"/>
+              </a:schemeClr>
+            </a:gs>
+          </a:gsLst>
+          <a:lin ang="5400000" scaled="0"/>
+        </a:gradFill>
+      </a:bgFillStyleLst>
+    </a:fmtScheme>
+  </a:themeElements>
+  <a:objectDefaults/>
+  <a:extraClrSchemeLst/>
+  <a:extLst>
+    <a:ext uri="{05A4C25C-085E-4340-85A3-A5531E510DB2}">
+      <thm15:themeFamily xmlns:thm15="http://schemas.microsoft.com/office/thememl/2012/main" name="Office Theme" id="{62F939B6-93AF-4DB8-9C6B-D6C7DFDC589F}" vid="{4A3C46E8-61CC-4603-A589-7422A47A8E4A}"/>
+    </a:ext>
+  </a:extLst>
+</a:theme>
 </file>
</xml_diff>